<commit_message>
Develop-Add TMSS AI tem300 protal link
</commit_message>
<xml_diff>
--- a/gw_image.pptx
+++ b/gw_image.pptx
@@ -8,6 +8,7 @@
     <p:sldId id="257" r:id="rId2"/>
     <p:sldId id="259" r:id="rId3"/>
     <p:sldId id="258" r:id="rId4"/>
+    <p:sldId id="260" r:id="rId5"/>
   </p:sldIdLst>
   <p:sldSz cx="12192000" cy="6858000"/>
   <p:notesSz cx="6858000" cy="9144000"/>
@@ -261,7 +262,7 @@
           <a:p>
             <a:fld id="{E7754EC2-AB64-A44C-A19A-0797FA0EB8DA}" type="datetimeFigureOut">
               <a:rPr kumimoji="1" lang="zh-TW" altLang="en-US" smtClean="0"/>
-              <a:t>2020/6/17</a:t>
+              <a:t>2020/7/17</a:t>
             </a:fld>
             <a:endParaRPr kumimoji="1" lang="zh-TW" altLang="en-US"/>
           </a:p>
@@ -459,7 +460,7 @@
           <a:p>
             <a:fld id="{E7754EC2-AB64-A44C-A19A-0797FA0EB8DA}" type="datetimeFigureOut">
               <a:rPr kumimoji="1" lang="zh-TW" altLang="en-US" smtClean="0"/>
-              <a:t>2020/6/17</a:t>
+              <a:t>2020/7/17</a:t>
             </a:fld>
             <a:endParaRPr kumimoji="1" lang="zh-TW" altLang="en-US"/>
           </a:p>
@@ -667,7 +668,7 @@
           <a:p>
             <a:fld id="{E7754EC2-AB64-A44C-A19A-0797FA0EB8DA}" type="datetimeFigureOut">
               <a:rPr kumimoji="1" lang="zh-TW" altLang="en-US" smtClean="0"/>
-              <a:t>2020/6/17</a:t>
+              <a:t>2020/7/17</a:t>
             </a:fld>
             <a:endParaRPr kumimoji="1" lang="zh-TW" altLang="en-US"/>
           </a:p>
@@ -865,7 +866,7 @@
           <a:p>
             <a:fld id="{E7754EC2-AB64-A44C-A19A-0797FA0EB8DA}" type="datetimeFigureOut">
               <a:rPr kumimoji="1" lang="zh-TW" altLang="en-US" smtClean="0"/>
-              <a:t>2020/6/17</a:t>
+              <a:t>2020/7/17</a:t>
             </a:fld>
             <a:endParaRPr kumimoji="1" lang="zh-TW" altLang="en-US"/>
           </a:p>
@@ -1140,7 +1141,7 @@
           <a:p>
             <a:fld id="{E7754EC2-AB64-A44C-A19A-0797FA0EB8DA}" type="datetimeFigureOut">
               <a:rPr kumimoji="1" lang="zh-TW" altLang="en-US" smtClean="0"/>
-              <a:t>2020/6/17</a:t>
+              <a:t>2020/7/17</a:t>
             </a:fld>
             <a:endParaRPr kumimoji="1" lang="zh-TW" altLang="en-US"/>
           </a:p>
@@ -1405,7 +1406,7 @@
           <a:p>
             <a:fld id="{E7754EC2-AB64-A44C-A19A-0797FA0EB8DA}" type="datetimeFigureOut">
               <a:rPr kumimoji="1" lang="zh-TW" altLang="en-US" smtClean="0"/>
-              <a:t>2020/6/17</a:t>
+              <a:t>2020/7/17</a:t>
             </a:fld>
             <a:endParaRPr kumimoji="1" lang="zh-TW" altLang="en-US"/>
           </a:p>
@@ -1817,7 +1818,7 @@
           <a:p>
             <a:fld id="{E7754EC2-AB64-A44C-A19A-0797FA0EB8DA}" type="datetimeFigureOut">
               <a:rPr kumimoji="1" lang="zh-TW" altLang="en-US" smtClean="0"/>
-              <a:t>2020/6/17</a:t>
+              <a:t>2020/7/17</a:t>
             </a:fld>
             <a:endParaRPr kumimoji="1" lang="zh-TW" altLang="en-US"/>
           </a:p>
@@ -1958,7 +1959,7 @@
           <a:p>
             <a:fld id="{E7754EC2-AB64-A44C-A19A-0797FA0EB8DA}" type="datetimeFigureOut">
               <a:rPr kumimoji="1" lang="zh-TW" altLang="en-US" smtClean="0"/>
-              <a:t>2020/6/17</a:t>
+              <a:t>2020/7/17</a:t>
             </a:fld>
             <a:endParaRPr kumimoji="1" lang="zh-TW" altLang="en-US"/>
           </a:p>
@@ -2071,7 +2072,7 @@
           <a:p>
             <a:fld id="{E7754EC2-AB64-A44C-A19A-0797FA0EB8DA}" type="datetimeFigureOut">
               <a:rPr kumimoji="1" lang="zh-TW" altLang="en-US" smtClean="0"/>
-              <a:t>2020/6/17</a:t>
+              <a:t>2020/7/17</a:t>
             </a:fld>
             <a:endParaRPr kumimoji="1" lang="zh-TW" altLang="en-US"/>
           </a:p>
@@ -2382,7 +2383,7 @@
           <a:p>
             <a:fld id="{E7754EC2-AB64-A44C-A19A-0797FA0EB8DA}" type="datetimeFigureOut">
               <a:rPr kumimoji="1" lang="zh-TW" altLang="en-US" smtClean="0"/>
-              <a:t>2020/6/17</a:t>
+              <a:t>2020/7/17</a:t>
             </a:fld>
             <a:endParaRPr kumimoji="1" lang="zh-TW" altLang="en-US"/>
           </a:p>
@@ -2670,7 +2671,7 @@
           <a:p>
             <a:fld id="{E7754EC2-AB64-A44C-A19A-0797FA0EB8DA}" type="datetimeFigureOut">
               <a:rPr kumimoji="1" lang="zh-TW" altLang="en-US" smtClean="0"/>
-              <a:t>2020/6/17</a:t>
+              <a:t>2020/7/17</a:t>
             </a:fld>
             <a:endParaRPr kumimoji="1" lang="zh-TW" altLang="en-US"/>
           </a:p>
@@ -2911,7 +2912,7 @@
           <a:p>
             <a:fld id="{E7754EC2-AB64-A44C-A19A-0797FA0EB8DA}" type="datetimeFigureOut">
               <a:rPr kumimoji="1" lang="zh-TW" altLang="en-US" smtClean="0"/>
-              <a:t>2020/6/17</a:t>
+              <a:t>2020/7/17</a:t>
             </a:fld>
             <a:endParaRPr kumimoji="1" lang="zh-TW" altLang="en-US"/>
           </a:p>
@@ -4163,6 +4164,114 @@
 </p:sld>
 </file>
 
+<file path=ppt/slides/slide4.xml><?xml version="1.0" encoding="utf-8"?>
+<p:sld xmlns:a="http://schemas.openxmlformats.org/drawingml/2006/main" xmlns:r="http://schemas.openxmlformats.org/officeDocument/2006/relationships" xmlns:p="http://schemas.openxmlformats.org/presentationml/2006/main">
+  <p:cSld>
+    <p:spTree>
+      <p:nvGrpSpPr>
+        <p:cNvPr id="1" name=""/>
+        <p:cNvGrpSpPr/>
+        <p:nvPr/>
+      </p:nvGrpSpPr>
+      <p:grpSpPr>
+        <a:xfrm>
+          <a:off x="0" y="0"/>
+          <a:ext cx="0" cy="0"/>
+          <a:chOff x="0" y="0"/>
+          <a:chExt cx="0" cy="0"/>
+        </a:xfrm>
+      </p:grpSpPr>
+      <p:pic>
+        <p:nvPicPr>
+          <p:cNvPr id="5" name="圖片 4" descr="一張含有 螢幕擷取畫面 的圖片&#10;&#10;自動產生的描述">
+            <a:extLst>
+              <a:ext uri="{FF2B5EF4-FFF2-40B4-BE49-F238E27FC236}">
+                <a16:creationId xmlns:a16="http://schemas.microsoft.com/office/drawing/2014/main" id="{081B8A63-4433-724A-9708-5C666BEEFCB0}"/>
+              </a:ext>
+            </a:extLst>
+          </p:cNvPr>
+          <p:cNvPicPr>
+            <a:picLocks noChangeAspect="1"/>
+          </p:cNvPicPr>
+          <p:nvPr/>
+        </p:nvPicPr>
+        <p:blipFill>
+          <a:blip r:embed="rId2"/>
+          <a:stretch>
+            <a:fillRect/>
+          </a:stretch>
+        </p:blipFill>
+        <p:spPr>
+          <a:xfrm>
+            <a:off x="884122" y="0"/>
+            <a:ext cx="10423755" cy="6858000"/>
+          </a:xfrm>
+          <a:prstGeom prst="rect">
+            <a:avLst/>
+          </a:prstGeom>
+        </p:spPr>
+      </p:pic>
+      <p:sp>
+        <p:nvSpPr>
+          <p:cNvPr id="6" name="圓角矩形 5">
+            <a:extLst>
+              <a:ext uri="{FF2B5EF4-FFF2-40B4-BE49-F238E27FC236}">
+                <a16:creationId xmlns:a16="http://schemas.microsoft.com/office/drawing/2014/main" id="{3161B866-4A17-AD42-B0FC-F08A282A5800}"/>
+              </a:ext>
+            </a:extLst>
+          </p:cNvPr>
+          <p:cNvSpPr/>
+          <p:nvPr/>
+        </p:nvSpPr>
+        <p:spPr>
+          <a:xfrm>
+            <a:off x="7543800" y="4757057"/>
+            <a:ext cx="1447800" cy="239485"/>
+          </a:xfrm>
+          <a:prstGeom prst="roundRect">
+            <a:avLst/>
+          </a:prstGeom>
+        </p:spPr>
+        <p:style>
+          <a:lnRef idx="0">
+            <a:schemeClr val="accent2"/>
+          </a:lnRef>
+          <a:fillRef idx="3">
+            <a:schemeClr val="accent2"/>
+          </a:fillRef>
+          <a:effectRef idx="3">
+            <a:schemeClr val="accent2"/>
+          </a:effectRef>
+          <a:fontRef idx="minor">
+            <a:schemeClr val="lt1"/>
+          </a:fontRef>
+        </p:style>
+        <p:txBody>
+          <a:bodyPr rtlCol="0" anchor="ctr"/>
+          <a:lstStyle/>
+          <a:p>
+            <a:pPr algn="ctr"/>
+            <a:r>
+              <a:rPr kumimoji="1" lang="en-US" altLang="zh-TW" sz="1200" dirty="0"/>
+              <a:t>TMSS AI</a:t>
+            </a:r>
+            <a:endParaRPr kumimoji="1" lang="zh-TW" altLang="en-US" sz="1200" dirty="0"/>
+          </a:p>
+        </p:txBody>
+      </p:sp>
+    </p:spTree>
+    <p:extLst>
+      <p:ext uri="{BB962C8B-B14F-4D97-AF65-F5344CB8AC3E}">
+        <p14:creationId xmlns:p14="http://schemas.microsoft.com/office/powerpoint/2010/main" val="2114216400"/>
+      </p:ext>
+    </p:extLst>
+  </p:cSld>
+  <p:clrMapOvr>
+    <a:masterClrMapping/>
+  </p:clrMapOvr>
+</p:sld>
+</file>
+
 <file path=ppt/theme/theme1.xml><?xml version="1.0" encoding="utf-8"?>
 <a:theme xmlns:a="http://schemas.openxmlformats.org/drawingml/2006/main" name="Office 佈景主題">
   <a:themeElements>

</xml_diff>

<commit_message>
Develop-Add puller lzd instant result showing modal in website
</commit_message>
<xml_diff>
--- a/gw_image.pptx
+++ b/gw_image.pptx
@@ -9,6 +9,7 @@
     <p:sldId id="259" r:id="rId3"/>
     <p:sldId id="258" r:id="rId4"/>
     <p:sldId id="260" r:id="rId5"/>
+    <p:sldId id="267" r:id="rId6"/>
   </p:sldIdLst>
   <p:sldSz cx="12192000" cy="6858000"/>
   <p:notesSz cx="6858000" cy="9144000"/>
@@ -262,7 +263,7 @@
           <a:p>
             <a:fld id="{E7754EC2-AB64-A44C-A19A-0797FA0EB8DA}" type="datetimeFigureOut">
               <a:rPr kumimoji="1" lang="zh-TW" altLang="en-US" smtClean="0"/>
-              <a:t>2020/7/17</a:t>
+              <a:t>2020/12/2</a:t>
             </a:fld>
             <a:endParaRPr kumimoji="1" lang="zh-TW" altLang="en-US"/>
           </a:p>
@@ -460,7 +461,7 @@
           <a:p>
             <a:fld id="{E7754EC2-AB64-A44C-A19A-0797FA0EB8DA}" type="datetimeFigureOut">
               <a:rPr kumimoji="1" lang="zh-TW" altLang="en-US" smtClean="0"/>
-              <a:t>2020/7/17</a:t>
+              <a:t>2020/12/2</a:t>
             </a:fld>
             <a:endParaRPr kumimoji="1" lang="zh-TW" altLang="en-US"/>
           </a:p>
@@ -668,7 +669,7 @@
           <a:p>
             <a:fld id="{E7754EC2-AB64-A44C-A19A-0797FA0EB8DA}" type="datetimeFigureOut">
               <a:rPr kumimoji="1" lang="zh-TW" altLang="en-US" smtClean="0"/>
-              <a:t>2020/7/17</a:t>
+              <a:t>2020/12/2</a:t>
             </a:fld>
             <a:endParaRPr kumimoji="1" lang="zh-TW" altLang="en-US"/>
           </a:p>
@@ -866,7 +867,7 @@
           <a:p>
             <a:fld id="{E7754EC2-AB64-A44C-A19A-0797FA0EB8DA}" type="datetimeFigureOut">
               <a:rPr kumimoji="1" lang="zh-TW" altLang="en-US" smtClean="0"/>
-              <a:t>2020/7/17</a:t>
+              <a:t>2020/12/2</a:t>
             </a:fld>
             <a:endParaRPr kumimoji="1" lang="zh-TW" altLang="en-US"/>
           </a:p>
@@ -1141,7 +1142,7 @@
           <a:p>
             <a:fld id="{E7754EC2-AB64-A44C-A19A-0797FA0EB8DA}" type="datetimeFigureOut">
               <a:rPr kumimoji="1" lang="zh-TW" altLang="en-US" smtClean="0"/>
-              <a:t>2020/7/17</a:t>
+              <a:t>2020/12/2</a:t>
             </a:fld>
             <a:endParaRPr kumimoji="1" lang="zh-TW" altLang="en-US"/>
           </a:p>
@@ -1406,7 +1407,7 @@
           <a:p>
             <a:fld id="{E7754EC2-AB64-A44C-A19A-0797FA0EB8DA}" type="datetimeFigureOut">
               <a:rPr kumimoji="1" lang="zh-TW" altLang="en-US" smtClean="0"/>
-              <a:t>2020/7/17</a:t>
+              <a:t>2020/12/2</a:t>
             </a:fld>
             <a:endParaRPr kumimoji="1" lang="zh-TW" altLang="en-US"/>
           </a:p>
@@ -1818,7 +1819,7 @@
           <a:p>
             <a:fld id="{E7754EC2-AB64-A44C-A19A-0797FA0EB8DA}" type="datetimeFigureOut">
               <a:rPr kumimoji="1" lang="zh-TW" altLang="en-US" smtClean="0"/>
-              <a:t>2020/7/17</a:t>
+              <a:t>2020/12/2</a:t>
             </a:fld>
             <a:endParaRPr kumimoji="1" lang="zh-TW" altLang="en-US"/>
           </a:p>
@@ -1959,7 +1960,7 @@
           <a:p>
             <a:fld id="{E7754EC2-AB64-A44C-A19A-0797FA0EB8DA}" type="datetimeFigureOut">
               <a:rPr kumimoji="1" lang="zh-TW" altLang="en-US" smtClean="0"/>
-              <a:t>2020/7/17</a:t>
+              <a:t>2020/12/2</a:t>
             </a:fld>
             <a:endParaRPr kumimoji="1" lang="zh-TW" altLang="en-US"/>
           </a:p>
@@ -2072,7 +2073,7 @@
           <a:p>
             <a:fld id="{E7754EC2-AB64-A44C-A19A-0797FA0EB8DA}" type="datetimeFigureOut">
               <a:rPr kumimoji="1" lang="zh-TW" altLang="en-US" smtClean="0"/>
-              <a:t>2020/7/17</a:t>
+              <a:t>2020/12/2</a:t>
             </a:fld>
             <a:endParaRPr kumimoji="1" lang="zh-TW" altLang="en-US"/>
           </a:p>
@@ -2383,7 +2384,7 @@
           <a:p>
             <a:fld id="{E7754EC2-AB64-A44C-A19A-0797FA0EB8DA}" type="datetimeFigureOut">
               <a:rPr kumimoji="1" lang="zh-TW" altLang="en-US" smtClean="0"/>
-              <a:t>2020/7/17</a:t>
+              <a:t>2020/12/2</a:t>
             </a:fld>
             <a:endParaRPr kumimoji="1" lang="zh-TW" altLang="en-US"/>
           </a:p>
@@ -2671,7 +2672,7 @@
           <a:p>
             <a:fld id="{E7754EC2-AB64-A44C-A19A-0797FA0EB8DA}" type="datetimeFigureOut">
               <a:rPr kumimoji="1" lang="zh-TW" altLang="en-US" smtClean="0"/>
-              <a:t>2020/7/17</a:t>
+              <a:t>2020/12/2</a:t>
             </a:fld>
             <a:endParaRPr kumimoji="1" lang="zh-TW" altLang="en-US"/>
           </a:p>
@@ -2912,7 +2913,7 @@
           <a:p>
             <a:fld id="{E7754EC2-AB64-A44C-A19A-0797FA0EB8DA}" type="datetimeFigureOut">
               <a:rPr kumimoji="1" lang="zh-TW" altLang="en-US" smtClean="0"/>
-              <a:t>2020/7/17</a:t>
+              <a:t>2020/12/2</a:t>
             </a:fld>
             <a:endParaRPr kumimoji="1" lang="zh-TW" altLang="en-US"/>
           </a:p>
@@ -4272,6 +4273,3061 @@
 </p:sld>
 </file>
 
+<file path=ppt/slides/slide5.xml><?xml version="1.0" encoding="utf-8"?>
+<p:sld xmlns:a="http://schemas.openxmlformats.org/drawingml/2006/main" xmlns:r="http://schemas.openxmlformats.org/officeDocument/2006/relationships" xmlns:p="http://schemas.openxmlformats.org/presentationml/2006/main">
+  <p:cSld>
+    <p:spTree>
+      <p:nvGrpSpPr>
+        <p:cNvPr id="1" name=""/>
+        <p:cNvGrpSpPr/>
+        <p:nvPr/>
+      </p:nvGrpSpPr>
+      <p:grpSpPr>
+        <a:xfrm>
+          <a:off x="0" y="0"/>
+          <a:ext cx="0" cy="0"/>
+          <a:chOff x="0" y="0"/>
+          <a:chExt cx="0" cy="0"/>
+        </a:xfrm>
+      </p:grpSpPr>
+      <p:grpSp>
+        <p:nvGrpSpPr>
+          <p:cNvPr id="2" name="群組 1">
+            <a:extLst>
+              <a:ext uri="{FF2B5EF4-FFF2-40B4-BE49-F238E27FC236}">
+                <a16:creationId xmlns:a16="http://schemas.microsoft.com/office/drawing/2014/main" id="{14CEC505-9B94-694F-BF73-3A4885B90C9C}"/>
+              </a:ext>
+            </a:extLst>
+          </p:cNvPr>
+          <p:cNvGrpSpPr/>
+          <p:nvPr/>
+        </p:nvGrpSpPr>
+        <p:grpSpPr>
+          <a:xfrm>
+            <a:off x="122852" y="489857"/>
+            <a:ext cx="12069148" cy="5206482"/>
+            <a:chOff x="122852" y="489857"/>
+            <a:chExt cx="12069148" cy="5206482"/>
+          </a:xfrm>
+        </p:grpSpPr>
+        <p:sp>
+          <p:nvSpPr>
+            <p:cNvPr id="104" name="圓角矩形 103">
+              <a:extLst>
+                <a:ext uri="{FF2B5EF4-FFF2-40B4-BE49-F238E27FC236}">
+                  <a16:creationId xmlns:a16="http://schemas.microsoft.com/office/drawing/2014/main" id="{0F8D38A5-5ED9-364D-8601-09FCD2ED9BF7}"/>
+                </a:ext>
+              </a:extLst>
+            </p:cNvPr>
+            <p:cNvSpPr/>
+            <p:nvPr/>
+          </p:nvSpPr>
+          <p:spPr>
+            <a:xfrm>
+              <a:off x="122852" y="489857"/>
+              <a:ext cx="12069148" cy="5206482"/>
+            </a:xfrm>
+            <a:prstGeom prst="roundRect">
+              <a:avLst/>
+            </a:prstGeom>
+            <a:solidFill>
+              <a:schemeClr val="accent5">
+                <a:lumMod val="20000"/>
+                <a:lumOff val="80000"/>
+              </a:schemeClr>
+            </a:solidFill>
+            <a:ln>
+              <a:noFill/>
+            </a:ln>
+          </p:spPr>
+          <p:style>
+            <a:lnRef idx="2">
+              <a:schemeClr val="accent1">
+                <a:shade val="50000"/>
+              </a:schemeClr>
+            </a:lnRef>
+            <a:fillRef idx="1">
+              <a:schemeClr val="accent1"/>
+            </a:fillRef>
+            <a:effectRef idx="0">
+              <a:schemeClr val="accent1"/>
+            </a:effectRef>
+            <a:fontRef idx="minor">
+              <a:schemeClr val="lt1"/>
+            </a:fontRef>
+          </p:style>
+          <p:txBody>
+            <a:bodyPr rtlCol="0" anchor="ctr"/>
+            <a:lstStyle/>
+            <a:p>
+              <a:pPr algn="ctr"/>
+              <a:endParaRPr kumimoji="1" lang="zh-TW" altLang="en-US"/>
+            </a:p>
+          </p:txBody>
+        </p:sp>
+        <p:sp>
+          <p:nvSpPr>
+            <p:cNvPr id="7" name="剪去並圓角化單一角落矩形 6">
+              <a:extLst>
+                <a:ext uri="{FF2B5EF4-FFF2-40B4-BE49-F238E27FC236}">
+                  <a16:creationId xmlns:a16="http://schemas.microsoft.com/office/drawing/2014/main" id="{C8DAF8C3-9ADD-9D4C-9B0F-9C52BCEE7D70}"/>
+                </a:ext>
+              </a:extLst>
+            </p:cNvPr>
+            <p:cNvSpPr/>
+            <p:nvPr/>
+          </p:nvSpPr>
+          <p:spPr>
+            <a:xfrm>
+              <a:off x="4145204" y="663278"/>
+              <a:ext cx="1702676" cy="662152"/>
+            </a:xfrm>
+            <a:prstGeom prst="snipRoundRect">
+              <a:avLst/>
+            </a:prstGeom>
+            <a:solidFill>
+              <a:srgbClr val="FFC000"/>
+            </a:solidFill>
+          </p:spPr>
+          <p:style>
+            <a:lnRef idx="2">
+              <a:schemeClr val="accent1">
+                <a:shade val="50000"/>
+              </a:schemeClr>
+            </a:lnRef>
+            <a:fillRef idx="1">
+              <a:schemeClr val="accent1"/>
+            </a:fillRef>
+            <a:effectRef idx="0">
+              <a:schemeClr val="accent1"/>
+            </a:effectRef>
+            <a:fontRef idx="minor">
+              <a:schemeClr val="lt1"/>
+            </a:fontRef>
+          </p:style>
+          <p:txBody>
+            <a:bodyPr rtlCol="0" anchor="ctr"/>
+            <a:lstStyle/>
+            <a:p>
+              <a:pPr algn="ctr"/>
+              <a:r>
+                <a:rPr kumimoji="1" lang="en-US" altLang="zh-TW" b="1" dirty="0" err="1">
+                  <a:solidFill>
+                    <a:schemeClr val="tx1"/>
+                  </a:solidFill>
+                </a:rPr>
+                <a:t>TMSS_Web</a:t>
+              </a:r>
+              <a:endParaRPr kumimoji="1" lang="zh-TW" altLang="en-US" b="1" dirty="0">
+                <a:solidFill>
+                  <a:schemeClr val="tx1"/>
+                </a:solidFill>
+              </a:endParaRPr>
+            </a:p>
+          </p:txBody>
+        </p:sp>
+        <p:sp>
+          <p:nvSpPr>
+            <p:cNvPr id="8" name="橢圓 7">
+              <a:extLst>
+                <a:ext uri="{FF2B5EF4-FFF2-40B4-BE49-F238E27FC236}">
+                  <a16:creationId xmlns:a16="http://schemas.microsoft.com/office/drawing/2014/main" id="{A58DB808-EE8A-7441-90E0-54FF6872417C}"/>
+                </a:ext>
+              </a:extLst>
+            </p:cNvPr>
+            <p:cNvSpPr/>
+            <p:nvPr/>
+          </p:nvSpPr>
+          <p:spPr>
+            <a:xfrm>
+              <a:off x="734597" y="1761609"/>
+              <a:ext cx="1765738" cy="420413"/>
+            </a:xfrm>
+            <a:prstGeom prst="ellipse">
+              <a:avLst/>
+            </a:prstGeom>
+            <a:solidFill>
+              <a:schemeClr val="accent6">
+                <a:lumMod val="60000"/>
+                <a:lumOff val="40000"/>
+              </a:schemeClr>
+            </a:solidFill>
+          </p:spPr>
+          <p:style>
+            <a:lnRef idx="2">
+              <a:schemeClr val="accent1">
+                <a:shade val="50000"/>
+              </a:schemeClr>
+            </a:lnRef>
+            <a:fillRef idx="1">
+              <a:schemeClr val="accent1"/>
+            </a:fillRef>
+            <a:effectRef idx="0">
+              <a:schemeClr val="accent1"/>
+            </a:effectRef>
+            <a:fontRef idx="minor">
+              <a:schemeClr val="lt1"/>
+            </a:fontRef>
+          </p:style>
+          <p:txBody>
+            <a:bodyPr rtlCol="0" anchor="ctr"/>
+            <a:lstStyle/>
+            <a:p>
+              <a:pPr algn="ctr"/>
+              <a:r>
+                <a:rPr kumimoji="1" lang="en-US" altLang="zh-TW" dirty="0" err="1">
+                  <a:solidFill>
+                    <a:schemeClr val="tx1"/>
+                  </a:solidFill>
+                </a:rPr>
+                <a:t>index.html</a:t>
+              </a:r>
+              <a:endParaRPr kumimoji="1" lang="zh-TW" altLang="en-US" dirty="0">
+                <a:solidFill>
+                  <a:schemeClr val="tx1"/>
+                </a:solidFill>
+              </a:endParaRPr>
+            </a:p>
+          </p:txBody>
+        </p:sp>
+        <p:sp>
+          <p:nvSpPr>
+            <p:cNvPr id="9" name="橢圓 8">
+              <a:extLst>
+                <a:ext uri="{FF2B5EF4-FFF2-40B4-BE49-F238E27FC236}">
+                  <a16:creationId xmlns:a16="http://schemas.microsoft.com/office/drawing/2014/main" id="{9135C318-D370-B44D-BDA6-F376C8869AD1}"/>
+                </a:ext>
+              </a:extLst>
+            </p:cNvPr>
+            <p:cNvSpPr/>
+            <p:nvPr/>
+          </p:nvSpPr>
+          <p:spPr>
+            <a:xfrm>
+              <a:off x="734597" y="2344933"/>
+              <a:ext cx="1765738" cy="420413"/>
+            </a:xfrm>
+            <a:prstGeom prst="ellipse">
+              <a:avLst/>
+            </a:prstGeom>
+            <a:solidFill>
+              <a:schemeClr val="accent6">
+                <a:lumMod val="60000"/>
+                <a:lumOff val="40000"/>
+              </a:schemeClr>
+            </a:solidFill>
+          </p:spPr>
+          <p:style>
+            <a:lnRef idx="2">
+              <a:schemeClr val="accent1">
+                <a:shade val="50000"/>
+              </a:schemeClr>
+            </a:lnRef>
+            <a:fillRef idx="1">
+              <a:schemeClr val="accent1"/>
+            </a:fillRef>
+            <a:effectRef idx="0">
+              <a:schemeClr val="accent1"/>
+            </a:effectRef>
+            <a:fontRef idx="minor">
+              <a:schemeClr val="lt1"/>
+            </a:fontRef>
+          </p:style>
+          <p:txBody>
+            <a:bodyPr rtlCol="0" anchor="ctr"/>
+            <a:lstStyle/>
+            <a:p>
+              <a:pPr algn="ctr"/>
+              <a:r>
+                <a:rPr kumimoji="1" lang="en-US" altLang="zh-TW" dirty="0" err="1">
+                  <a:solidFill>
+                    <a:schemeClr val="tx1"/>
+                  </a:solidFill>
+                </a:rPr>
+                <a:t>update.sh</a:t>
+              </a:r>
+              <a:endParaRPr kumimoji="1" lang="zh-TW" altLang="en-US" dirty="0">
+                <a:solidFill>
+                  <a:schemeClr val="tx1"/>
+                </a:solidFill>
+              </a:endParaRPr>
+            </a:p>
+          </p:txBody>
+        </p:sp>
+        <p:sp>
+          <p:nvSpPr>
+            <p:cNvPr id="10" name="橢圓 9">
+              <a:extLst>
+                <a:ext uri="{FF2B5EF4-FFF2-40B4-BE49-F238E27FC236}">
+                  <a16:creationId xmlns:a16="http://schemas.microsoft.com/office/drawing/2014/main" id="{787D5EA8-9676-104E-8888-F22266CD344B}"/>
+                </a:ext>
+              </a:extLst>
+            </p:cNvPr>
+            <p:cNvSpPr/>
+            <p:nvPr/>
+          </p:nvSpPr>
+          <p:spPr>
+            <a:xfrm>
+              <a:off x="618230" y="2929003"/>
+              <a:ext cx="1994503" cy="420413"/>
+            </a:xfrm>
+            <a:prstGeom prst="ellipse">
+              <a:avLst/>
+            </a:prstGeom>
+            <a:solidFill>
+              <a:schemeClr val="accent6">
+                <a:lumMod val="60000"/>
+                <a:lumOff val="40000"/>
+              </a:schemeClr>
+            </a:solidFill>
+          </p:spPr>
+          <p:style>
+            <a:lnRef idx="2">
+              <a:schemeClr val="accent1">
+                <a:shade val="50000"/>
+              </a:schemeClr>
+            </a:lnRef>
+            <a:fillRef idx="1">
+              <a:schemeClr val="accent1"/>
+            </a:fillRef>
+            <a:effectRef idx="0">
+              <a:schemeClr val="accent1"/>
+            </a:effectRef>
+            <a:fontRef idx="minor">
+              <a:schemeClr val="lt1"/>
+            </a:fontRef>
+          </p:style>
+          <p:txBody>
+            <a:bodyPr rtlCol="0" anchor="ctr"/>
+            <a:lstStyle/>
+            <a:p>
+              <a:pPr algn="ctr"/>
+              <a:r>
+                <a:rPr kumimoji="1" lang="en-US" altLang="zh-TW" sz="1300" dirty="0" err="1">
+                  <a:solidFill>
+                    <a:schemeClr val="tx1"/>
+                  </a:solidFill>
+                </a:rPr>
+                <a:t>apache_restart.sh</a:t>
+              </a:r>
+              <a:endParaRPr kumimoji="1" lang="zh-TW" altLang="en-US" sz="1300" dirty="0">
+                <a:solidFill>
+                  <a:schemeClr val="tx1"/>
+                </a:solidFill>
+              </a:endParaRPr>
+            </a:p>
+          </p:txBody>
+        </p:sp>
+        <p:cxnSp>
+          <p:nvCxnSpPr>
+            <p:cNvPr id="26" name="肘形接點 25">
+              <a:extLst>
+                <a:ext uri="{FF2B5EF4-FFF2-40B4-BE49-F238E27FC236}">
+                  <a16:creationId xmlns:a16="http://schemas.microsoft.com/office/drawing/2014/main" id="{CDE7DD5C-2134-7E46-9329-3BA3968D6A17}"/>
+                </a:ext>
+              </a:extLst>
+            </p:cNvPr>
+            <p:cNvCxnSpPr>
+              <a:cxnSpLocks/>
+              <a:stCxn id="7" idx="2"/>
+              <a:endCxn id="8" idx="2"/>
+            </p:cNvCxnSpPr>
+            <p:nvPr/>
+          </p:nvCxnSpPr>
+          <p:spPr>
+            <a:xfrm rot="10800000" flipV="1">
+              <a:off x="734598" y="994354"/>
+              <a:ext cx="3410607" cy="977462"/>
+            </a:xfrm>
+            <a:prstGeom prst="bentConnector3">
+              <a:avLst>
+                <a:gd name="adj1" fmla="val 110134"/>
+              </a:avLst>
+            </a:prstGeom>
+            <a:ln w="12700">
+              <a:tailEnd type="triangle"/>
+            </a:ln>
+          </p:spPr>
+          <p:style>
+            <a:lnRef idx="1">
+              <a:schemeClr val="accent1"/>
+            </a:lnRef>
+            <a:fillRef idx="0">
+              <a:schemeClr val="accent1"/>
+            </a:fillRef>
+            <a:effectRef idx="0">
+              <a:schemeClr val="accent1"/>
+            </a:effectRef>
+            <a:fontRef idx="minor">
+              <a:schemeClr val="tx1"/>
+            </a:fontRef>
+          </p:style>
+        </p:cxnSp>
+        <p:cxnSp>
+          <p:nvCxnSpPr>
+            <p:cNvPr id="31" name="肘形接點 30">
+              <a:extLst>
+                <a:ext uri="{FF2B5EF4-FFF2-40B4-BE49-F238E27FC236}">
+                  <a16:creationId xmlns:a16="http://schemas.microsoft.com/office/drawing/2014/main" id="{13AC6924-99A8-9148-AB1F-BDFFA4AAAD4B}"/>
+                </a:ext>
+              </a:extLst>
+            </p:cNvPr>
+            <p:cNvCxnSpPr>
+              <a:cxnSpLocks/>
+              <a:stCxn id="7" idx="2"/>
+              <a:endCxn id="10" idx="2"/>
+            </p:cNvCxnSpPr>
+            <p:nvPr/>
+          </p:nvCxnSpPr>
+          <p:spPr>
+            <a:xfrm rot="10800000" flipV="1">
+              <a:off x="618230" y="994354"/>
+              <a:ext cx="3526974" cy="2144856"/>
+            </a:xfrm>
+            <a:prstGeom prst="bentConnector3">
+              <a:avLst>
+                <a:gd name="adj1" fmla="val 106481"/>
+              </a:avLst>
+            </a:prstGeom>
+            <a:ln w="12700">
+              <a:tailEnd type="triangle"/>
+            </a:ln>
+          </p:spPr>
+          <p:style>
+            <a:lnRef idx="1">
+              <a:schemeClr val="accent1"/>
+            </a:lnRef>
+            <a:fillRef idx="0">
+              <a:schemeClr val="accent1"/>
+            </a:fillRef>
+            <a:effectRef idx="0">
+              <a:schemeClr val="accent1"/>
+            </a:effectRef>
+            <a:fontRef idx="minor">
+              <a:schemeClr val="tx1"/>
+            </a:fontRef>
+          </p:style>
+        </p:cxnSp>
+        <p:grpSp>
+          <p:nvGrpSpPr>
+            <p:cNvPr id="5" name="群組 4">
+              <a:extLst>
+                <a:ext uri="{FF2B5EF4-FFF2-40B4-BE49-F238E27FC236}">
+                  <a16:creationId xmlns:a16="http://schemas.microsoft.com/office/drawing/2014/main" id="{A5F6A25C-309F-5541-AAA8-95E653D78E8C}"/>
+                </a:ext>
+              </a:extLst>
+            </p:cNvPr>
+            <p:cNvGrpSpPr/>
+            <p:nvPr/>
+          </p:nvGrpSpPr>
+          <p:grpSpPr>
+            <a:xfrm>
+              <a:off x="8372529" y="1640205"/>
+              <a:ext cx="1627600" cy="3960091"/>
+              <a:chOff x="6647905" y="1640205"/>
+              <a:chExt cx="1627600" cy="3960091"/>
+            </a:xfrm>
+          </p:grpSpPr>
+          <p:sp>
+            <p:nvSpPr>
+              <p:cNvPr id="110" name="圓角矩形 109">
+                <a:extLst>
+                  <a:ext uri="{FF2B5EF4-FFF2-40B4-BE49-F238E27FC236}">
+                    <a16:creationId xmlns:a16="http://schemas.microsoft.com/office/drawing/2014/main" id="{C20FB4C9-9248-CD4E-B8AA-E095C9D76870}"/>
+                  </a:ext>
+                </a:extLst>
+              </p:cNvPr>
+              <p:cNvSpPr/>
+              <p:nvPr/>
+            </p:nvSpPr>
+            <p:spPr>
+              <a:xfrm>
+                <a:off x="6647905" y="1640205"/>
+                <a:ext cx="1627600" cy="3960091"/>
+              </a:xfrm>
+              <a:prstGeom prst="roundRect">
+                <a:avLst/>
+              </a:prstGeom>
+              <a:solidFill>
+                <a:schemeClr val="accent4">
+                  <a:lumMod val="40000"/>
+                  <a:lumOff val="60000"/>
+                </a:schemeClr>
+              </a:solidFill>
+              <a:ln>
+                <a:noFill/>
+              </a:ln>
+            </p:spPr>
+            <p:style>
+              <a:lnRef idx="2">
+                <a:schemeClr val="accent1">
+                  <a:shade val="50000"/>
+                </a:schemeClr>
+              </a:lnRef>
+              <a:fillRef idx="1">
+                <a:schemeClr val="accent1"/>
+              </a:fillRef>
+              <a:effectRef idx="0">
+                <a:schemeClr val="accent1"/>
+              </a:effectRef>
+              <a:fontRef idx="minor">
+                <a:schemeClr val="lt1"/>
+              </a:fontRef>
+            </p:style>
+            <p:txBody>
+              <a:bodyPr rtlCol="0" anchor="ctr"/>
+              <a:lstStyle/>
+              <a:p>
+                <a:pPr algn="ctr"/>
+                <a:endParaRPr kumimoji="1" lang="zh-TW" altLang="en-US"/>
+              </a:p>
+            </p:txBody>
+          </p:sp>
+          <p:grpSp>
+            <p:nvGrpSpPr>
+              <p:cNvPr id="111" name="群組 110">
+                <a:extLst>
+                  <a:ext uri="{FF2B5EF4-FFF2-40B4-BE49-F238E27FC236}">
+                    <a16:creationId xmlns:a16="http://schemas.microsoft.com/office/drawing/2014/main" id="{FED5425D-A343-FE45-84CC-F445674806C4}"/>
+                  </a:ext>
+                </a:extLst>
+              </p:cNvPr>
+              <p:cNvGrpSpPr/>
+              <p:nvPr/>
+            </p:nvGrpSpPr>
+            <p:grpSpPr>
+              <a:xfrm>
+                <a:off x="7114385" y="1761609"/>
+                <a:ext cx="1135117" cy="1408384"/>
+                <a:chOff x="8213843" y="1728952"/>
+                <a:chExt cx="1135117" cy="1408384"/>
+              </a:xfrm>
+            </p:grpSpPr>
+            <p:sp>
+              <p:nvSpPr>
+                <p:cNvPr id="13" name="剪去並圓角化單一角落矩形 12">
+                  <a:extLst>
+                    <a:ext uri="{FF2B5EF4-FFF2-40B4-BE49-F238E27FC236}">
+                      <a16:creationId xmlns:a16="http://schemas.microsoft.com/office/drawing/2014/main" id="{7B9067AF-F38E-4C49-B69E-76C32081345C}"/>
+                    </a:ext>
+                  </a:extLst>
+                </p:cNvPr>
+                <p:cNvSpPr/>
+                <p:nvPr/>
+              </p:nvSpPr>
+              <p:spPr>
+                <a:xfrm>
+                  <a:off x="8295298" y="1728952"/>
+                  <a:ext cx="972208" cy="662152"/>
+                </a:xfrm>
+                <a:prstGeom prst="snipRoundRect">
+                  <a:avLst/>
+                </a:prstGeom>
+                <a:solidFill>
+                  <a:srgbClr val="FFC000"/>
+                </a:solidFill>
+              </p:spPr>
+              <p:style>
+                <a:lnRef idx="2">
+                  <a:schemeClr val="accent1">
+                    <a:shade val="50000"/>
+                  </a:schemeClr>
+                </a:lnRef>
+                <a:fillRef idx="1">
+                  <a:schemeClr val="accent1"/>
+                </a:fillRef>
+                <a:effectRef idx="0">
+                  <a:schemeClr val="accent1"/>
+                </a:effectRef>
+                <a:fontRef idx="minor">
+                  <a:schemeClr val="lt1"/>
+                </a:fontRef>
+              </p:style>
+              <p:txBody>
+                <a:bodyPr rtlCol="0" anchor="ctr"/>
+                <a:lstStyle/>
+                <a:p>
+                  <a:pPr algn="ctr"/>
+                  <a:r>
+                    <a:rPr kumimoji="1" lang="en-US" altLang="zh-TW" dirty="0">
+                      <a:solidFill>
+                        <a:schemeClr val="tx1"/>
+                      </a:solidFill>
+                    </a:rPr>
+                    <a:t>puller</a:t>
+                  </a:r>
+                  <a:endParaRPr kumimoji="1" lang="zh-TW" altLang="en-US" dirty="0">
+                    <a:solidFill>
+                      <a:schemeClr val="tx1"/>
+                    </a:solidFill>
+                  </a:endParaRPr>
+                </a:p>
+              </p:txBody>
+            </p:sp>
+            <p:sp>
+              <p:nvSpPr>
+                <p:cNvPr id="22" name="橢圓 21">
+                  <a:extLst>
+                    <a:ext uri="{FF2B5EF4-FFF2-40B4-BE49-F238E27FC236}">
+                      <a16:creationId xmlns:a16="http://schemas.microsoft.com/office/drawing/2014/main" id="{2E565F98-7059-2C4A-969B-1A8A4AC02283}"/>
+                    </a:ext>
+                  </a:extLst>
+                </p:cNvPr>
+                <p:cNvSpPr/>
+                <p:nvPr/>
+              </p:nvSpPr>
+              <p:spPr>
+                <a:xfrm>
+                  <a:off x="8213843" y="2716923"/>
+                  <a:ext cx="1135117" cy="420413"/>
+                </a:xfrm>
+                <a:prstGeom prst="ellipse">
+                  <a:avLst/>
+                </a:prstGeom>
+                <a:solidFill>
+                  <a:schemeClr val="accent6">
+                    <a:lumMod val="60000"/>
+                    <a:lumOff val="40000"/>
+                  </a:schemeClr>
+                </a:solidFill>
+              </p:spPr>
+              <p:style>
+                <a:lnRef idx="2">
+                  <a:schemeClr val="accent1">
+                    <a:shade val="50000"/>
+                  </a:schemeClr>
+                </a:lnRef>
+                <a:fillRef idx="1">
+                  <a:schemeClr val="accent1"/>
+                </a:fillRef>
+                <a:effectRef idx="0">
+                  <a:schemeClr val="accent1"/>
+                </a:effectRef>
+                <a:fontRef idx="minor">
+                  <a:schemeClr val="lt1"/>
+                </a:fontRef>
+              </p:style>
+              <p:txBody>
+                <a:bodyPr rtlCol="0" anchor="ctr"/>
+                <a:lstStyle/>
+                <a:p>
+                  <a:pPr algn="ctr"/>
+                  <a:r>
+                    <a:rPr kumimoji="1" lang="en-US" altLang="zh-TW" sz="1100" dirty="0">
+                      <a:solidFill>
+                        <a:schemeClr val="tx1"/>
+                      </a:solidFill>
+                    </a:rPr>
+                    <a:t>Puller LZD HTML</a:t>
+                  </a:r>
+                  <a:endParaRPr kumimoji="1" lang="zh-TW" altLang="en-US" sz="1100" dirty="0">
+                    <a:solidFill>
+                      <a:schemeClr val="tx1"/>
+                    </a:solidFill>
+                  </a:endParaRPr>
+                </a:p>
+              </p:txBody>
+            </p:sp>
+            <p:cxnSp>
+              <p:nvCxnSpPr>
+                <p:cNvPr id="96" name="肘形接點 95">
+                  <a:extLst>
+                    <a:ext uri="{FF2B5EF4-FFF2-40B4-BE49-F238E27FC236}">
+                      <a16:creationId xmlns:a16="http://schemas.microsoft.com/office/drawing/2014/main" id="{97A821A8-303D-4444-99A3-AD4D5CE953FD}"/>
+                    </a:ext>
+                  </a:extLst>
+                </p:cNvPr>
+                <p:cNvCxnSpPr>
+                  <a:cxnSpLocks/>
+                  <a:stCxn id="13" idx="2"/>
+                  <a:endCxn id="22" idx="2"/>
+                </p:cNvCxnSpPr>
+                <p:nvPr/>
+              </p:nvCxnSpPr>
+              <p:spPr>
+                <a:xfrm rot="10800000" flipV="1">
+                  <a:off x="8213844" y="2060028"/>
+                  <a:ext cx="81455" cy="867102"/>
+                </a:xfrm>
+                <a:prstGeom prst="bentConnector3">
+                  <a:avLst>
+                    <a:gd name="adj1" fmla="val 431811"/>
+                  </a:avLst>
+                </a:prstGeom>
+                <a:ln w="9525">
+                  <a:tailEnd type="triangle"/>
+                </a:ln>
+              </p:spPr>
+              <p:style>
+                <a:lnRef idx="1">
+                  <a:schemeClr val="accent1"/>
+                </a:lnRef>
+                <a:fillRef idx="0">
+                  <a:schemeClr val="accent1"/>
+                </a:fillRef>
+                <a:effectRef idx="0">
+                  <a:schemeClr val="accent1"/>
+                </a:effectRef>
+                <a:fontRef idx="minor">
+                  <a:schemeClr val="tx1"/>
+                </a:fontRef>
+              </p:style>
+            </p:cxnSp>
+          </p:grpSp>
+          <p:sp>
+            <p:nvSpPr>
+              <p:cNvPr id="45" name="剪去並圓角化單一角落矩形 44">
+                <a:extLst>
+                  <a:ext uri="{FF2B5EF4-FFF2-40B4-BE49-F238E27FC236}">
+                    <a16:creationId xmlns:a16="http://schemas.microsoft.com/office/drawing/2014/main" id="{795EF913-E748-F44B-B856-A79A29087176}"/>
+                  </a:ext>
+                </a:extLst>
+              </p:cNvPr>
+              <p:cNvSpPr/>
+              <p:nvPr/>
+            </p:nvSpPr>
+            <p:spPr>
+              <a:xfrm>
+                <a:off x="7153674" y="3332904"/>
+                <a:ext cx="972208" cy="420413"/>
+              </a:xfrm>
+              <a:prstGeom prst="snipRoundRect">
+                <a:avLst/>
+              </a:prstGeom>
+              <a:solidFill>
+                <a:schemeClr val="accent5">
+                  <a:lumMod val="60000"/>
+                  <a:lumOff val="40000"/>
+                </a:schemeClr>
+              </a:solidFill>
+            </p:spPr>
+            <p:style>
+              <a:lnRef idx="2">
+                <a:schemeClr val="accent1">
+                  <a:shade val="50000"/>
+                </a:schemeClr>
+              </a:lnRef>
+              <a:fillRef idx="1">
+                <a:schemeClr val="accent1"/>
+              </a:fillRef>
+              <a:effectRef idx="0">
+                <a:schemeClr val="accent1"/>
+              </a:effectRef>
+              <a:fontRef idx="minor">
+                <a:schemeClr val="lt1"/>
+              </a:fontRef>
+            </p:style>
+            <p:txBody>
+              <a:bodyPr rtlCol="0" anchor="ctr"/>
+              <a:lstStyle/>
+              <a:p>
+                <a:pPr algn="ctr"/>
+                <a:r>
+                  <a:rPr kumimoji="1" lang="en-US" altLang="zh-TW" sz="1300" dirty="0">
+                    <a:solidFill>
+                      <a:schemeClr val="tx1"/>
+                    </a:solidFill>
+                  </a:rPr>
+                  <a:t>log</a:t>
+                </a:r>
+                <a:endParaRPr kumimoji="1" lang="zh-TW" altLang="en-US" sz="1300" dirty="0">
+                  <a:solidFill>
+                    <a:schemeClr val="tx1"/>
+                  </a:solidFill>
+                </a:endParaRPr>
+              </a:p>
+            </p:txBody>
+          </p:sp>
+          <p:sp>
+            <p:nvSpPr>
+              <p:cNvPr id="46" name="剪去並圓角化單一角落矩形 45">
+                <a:extLst>
+                  <a:ext uri="{FF2B5EF4-FFF2-40B4-BE49-F238E27FC236}">
+                    <a16:creationId xmlns:a16="http://schemas.microsoft.com/office/drawing/2014/main" id="{1FEB1020-FAE3-8C44-9F10-B771CD2ED2AE}"/>
+                  </a:ext>
+                </a:extLst>
+              </p:cNvPr>
+              <p:cNvSpPr/>
+              <p:nvPr/>
+            </p:nvSpPr>
+            <p:spPr>
+              <a:xfrm>
+                <a:off x="7153674" y="3921483"/>
+                <a:ext cx="972208" cy="420413"/>
+              </a:xfrm>
+              <a:prstGeom prst="snipRoundRect">
+                <a:avLst/>
+              </a:prstGeom>
+              <a:solidFill>
+                <a:schemeClr val="accent5">
+                  <a:lumMod val="60000"/>
+                  <a:lumOff val="40000"/>
+                </a:schemeClr>
+              </a:solidFill>
+            </p:spPr>
+            <p:style>
+              <a:lnRef idx="2">
+                <a:schemeClr val="accent1">
+                  <a:shade val="50000"/>
+                </a:schemeClr>
+              </a:lnRef>
+              <a:fillRef idx="1">
+                <a:schemeClr val="accent1"/>
+              </a:fillRef>
+              <a:effectRef idx="0">
+                <a:schemeClr val="accent1"/>
+              </a:effectRef>
+              <a:fontRef idx="minor">
+                <a:schemeClr val="lt1"/>
+              </a:fontRef>
+            </p:style>
+            <p:txBody>
+              <a:bodyPr rtlCol="0" anchor="ctr"/>
+              <a:lstStyle/>
+              <a:p>
+                <a:pPr algn="ctr"/>
+                <a:r>
+                  <a:rPr kumimoji="1" lang="en-US" altLang="zh-TW" sz="1300" dirty="0" err="1">
+                    <a:solidFill>
+                      <a:schemeClr val="tx1"/>
+                    </a:solidFill>
+                  </a:rPr>
+                  <a:t>cvx_log</a:t>
+                </a:r>
+                <a:endParaRPr kumimoji="1" lang="zh-TW" altLang="en-US" sz="1300" dirty="0">
+                  <a:solidFill>
+                    <a:schemeClr val="tx1"/>
+                  </a:solidFill>
+                </a:endParaRPr>
+              </a:p>
+            </p:txBody>
+          </p:sp>
+          <p:cxnSp>
+            <p:nvCxnSpPr>
+              <p:cNvPr id="47" name="肘形接點 46">
+                <a:extLst>
+                  <a:ext uri="{FF2B5EF4-FFF2-40B4-BE49-F238E27FC236}">
+                    <a16:creationId xmlns:a16="http://schemas.microsoft.com/office/drawing/2014/main" id="{FEFE146A-4683-1542-80E2-3648494B619C}"/>
+                  </a:ext>
+                </a:extLst>
+              </p:cNvPr>
+              <p:cNvCxnSpPr>
+                <a:cxnSpLocks/>
+                <a:stCxn id="13" idx="2"/>
+                <a:endCxn id="45" idx="2"/>
+              </p:cNvCxnSpPr>
+              <p:nvPr/>
+            </p:nvCxnSpPr>
+            <p:spPr>
+              <a:xfrm rot="10800000" flipV="1">
+                <a:off x="7153674" y="2092685"/>
+                <a:ext cx="42166" cy="1450426"/>
+              </a:xfrm>
+              <a:prstGeom prst="bentConnector3">
+                <a:avLst>
+                  <a:gd name="adj1" fmla="val 832932"/>
+                </a:avLst>
+              </a:prstGeom>
+              <a:ln w="9525">
+                <a:tailEnd type="triangle"/>
+              </a:ln>
+            </p:spPr>
+            <p:style>
+              <a:lnRef idx="1">
+                <a:schemeClr val="accent1"/>
+              </a:lnRef>
+              <a:fillRef idx="0">
+                <a:schemeClr val="accent1"/>
+              </a:fillRef>
+              <a:effectRef idx="0">
+                <a:schemeClr val="accent1"/>
+              </a:effectRef>
+              <a:fontRef idx="minor">
+                <a:schemeClr val="tx1"/>
+              </a:fontRef>
+            </p:style>
+          </p:cxnSp>
+          <p:cxnSp>
+            <p:nvCxnSpPr>
+              <p:cNvPr id="51" name="肘形接點 50">
+                <a:extLst>
+                  <a:ext uri="{FF2B5EF4-FFF2-40B4-BE49-F238E27FC236}">
+                    <a16:creationId xmlns:a16="http://schemas.microsoft.com/office/drawing/2014/main" id="{06EE12AD-B59F-884E-B476-FCAF053DD3B3}"/>
+                  </a:ext>
+                </a:extLst>
+              </p:cNvPr>
+              <p:cNvCxnSpPr>
+                <a:cxnSpLocks/>
+                <a:stCxn id="13" idx="2"/>
+                <a:endCxn id="46" idx="2"/>
+              </p:cNvCxnSpPr>
+              <p:nvPr/>
+            </p:nvCxnSpPr>
+            <p:spPr>
+              <a:xfrm rot="10800000" flipV="1">
+                <a:off x="7153674" y="2092684"/>
+                <a:ext cx="42166" cy="2039005"/>
+              </a:xfrm>
+              <a:prstGeom prst="bentConnector3">
+                <a:avLst>
+                  <a:gd name="adj1" fmla="val 830133"/>
+                </a:avLst>
+              </a:prstGeom>
+              <a:ln w="9525">
+                <a:tailEnd type="triangle"/>
+              </a:ln>
+            </p:spPr>
+            <p:style>
+              <a:lnRef idx="1">
+                <a:schemeClr val="accent1"/>
+              </a:lnRef>
+              <a:fillRef idx="0">
+                <a:schemeClr val="accent1"/>
+              </a:fillRef>
+              <a:effectRef idx="0">
+                <a:schemeClr val="accent1"/>
+              </a:effectRef>
+              <a:fontRef idx="minor">
+                <a:schemeClr val="tx1"/>
+              </a:fontRef>
+            </p:style>
+          </p:cxnSp>
+        </p:grpSp>
+        <p:grpSp>
+          <p:nvGrpSpPr>
+            <p:cNvPr id="4" name="群組 3">
+              <a:extLst>
+                <a:ext uri="{FF2B5EF4-FFF2-40B4-BE49-F238E27FC236}">
+                  <a16:creationId xmlns:a16="http://schemas.microsoft.com/office/drawing/2014/main" id="{CB67ED82-18A6-F142-8017-820F0294D3F3}"/>
+                </a:ext>
+              </a:extLst>
+            </p:cNvPr>
+            <p:cNvGrpSpPr/>
+            <p:nvPr/>
+          </p:nvGrpSpPr>
+          <p:grpSpPr>
+            <a:xfrm>
+              <a:off x="10272893" y="1640205"/>
+              <a:ext cx="1627600" cy="3960091"/>
+              <a:chOff x="8548269" y="1640205"/>
+              <a:chExt cx="1627600" cy="3960091"/>
+            </a:xfrm>
+          </p:grpSpPr>
+          <p:sp>
+            <p:nvSpPr>
+              <p:cNvPr id="113" name="圓角矩形 112">
+                <a:extLst>
+                  <a:ext uri="{FF2B5EF4-FFF2-40B4-BE49-F238E27FC236}">
+                    <a16:creationId xmlns:a16="http://schemas.microsoft.com/office/drawing/2014/main" id="{4AEF20BA-2556-F04A-919B-46AD09667FE2}"/>
+                  </a:ext>
+                </a:extLst>
+              </p:cNvPr>
+              <p:cNvSpPr/>
+              <p:nvPr/>
+            </p:nvSpPr>
+            <p:spPr>
+              <a:xfrm>
+                <a:off x="8548269" y="1640205"/>
+                <a:ext cx="1627600" cy="3960091"/>
+              </a:xfrm>
+              <a:prstGeom prst="roundRect">
+                <a:avLst/>
+              </a:prstGeom>
+              <a:solidFill>
+                <a:schemeClr val="accent4">
+                  <a:lumMod val="40000"/>
+                  <a:lumOff val="60000"/>
+                </a:schemeClr>
+              </a:solidFill>
+              <a:ln>
+                <a:noFill/>
+              </a:ln>
+            </p:spPr>
+            <p:style>
+              <a:lnRef idx="2">
+                <a:schemeClr val="accent1">
+                  <a:shade val="50000"/>
+                </a:schemeClr>
+              </a:lnRef>
+              <a:fillRef idx="1">
+                <a:schemeClr val="accent1"/>
+              </a:fillRef>
+              <a:effectRef idx="0">
+                <a:schemeClr val="accent1"/>
+              </a:effectRef>
+              <a:fontRef idx="minor">
+                <a:schemeClr val="lt1"/>
+              </a:fontRef>
+            </p:style>
+            <p:txBody>
+              <a:bodyPr rtlCol="0" anchor="ctr"/>
+              <a:lstStyle/>
+              <a:p>
+                <a:pPr algn="ctr"/>
+                <a:endParaRPr kumimoji="1" lang="zh-TW" altLang="en-US"/>
+              </a:p>
+            </p:txBody>
+          </p:sp>
+          <p:grpSp>
+            <p:nvGrpSpPr>
+              <p:cNvPr id="114" name="群組 113">
+                <a:extLst>
+                  <a:ext uri="{FF2B5EF4-FFF2-40B4-BE49-F238E27FC236}">
+                    <a16:creationId xmlns:a16="http://schemas.microsoft.com/office/drawing/2014/main" id="{4AA23DDC-77FE-3246-A6FF-FB6B54654064}"/>
+                  </a:ext>
+                </a:extLst>
+              </p:cNvPr>
+              <p:cNvGrpSpPr/>
+              <p:nvPr/>
+            </p:nvGrpSpPr>
+            <p:grpSpPr>
+              <a:xfrm>
+                <a:off x="9027272" y="1761609"/>
+                <a:ext cx="1135117" cy="1408383"/>
+                <a:chOff x="10126730" y="1728952"/>
+                <a:chExt cx="1135117" cy="1408383"/>
+              </a:xfrm>
+            </p:grpSpPr>
+            <p:sp>
+              <p:nvSpPr>
+                <p:cNvPr id="14" name="剪去並圓角化單一角落矩形 13">
+                  <a:extLst>
+                    <a:ext uri="{FF2B5EF4-FFF2-40B4-BE49-F238E27FC236}">
+                      <a16:creationId xmlns:a16="http://schemas.microsoft.com/office/drawing/2014/main" id="{9F64C413-A290-CA42-9FA8-F65D0C020A69}"/>
+                    </a:ext>
+                  </a:extLst>
+                </p:cNvPr>
+                <p:cNvSpPr/>
+                <p:nvPr/>
+              </p:nvSpPr>
+              <p:spPr>
+                <a:xfrm>
+                  <a:off x="10208185" y="1728952"/>
+                  <a:ext cx="972208" cy="662152"/>
+                </a:xfrm>
+                <a:prstGeom prst="snipRoundRect">
+                  <a:avLst/>
+                </a:prstGeom>
+                <a:solidFill>
+                  <a:srgbClr val="FFC000"/>
+                </a:solidFill>
+              </p:spPr>
+              <p:style>
+                <a:lnRef idx="2">
+                  <a:schemeClr val="accent1">
+                    <a:shade val="50000"/>
+                  </a:schemeClr>
+                </a:lnRef>
+                <a:fillRef idx="1">
+                  <a:schemeClr val="accent1"/>
+                </a:fillRef>
+                <a:effectRef idx="0">
+                  <a:schemeClr val="accent1"/>
+                </a:effectRef>
+                <a:fontRef idx="minor">
+                  <a:schemeClr val="lt1"/>
+                </a:fontRef>
+              </p:style>
+              <p:txBody>
+                <a:bodyPr rtlCol="0" anchor="ctr"/>
+                <a:lstStyle/>
+                <a:p>
+                  <a:pPr algn="ctr"/>
+                  <a:r>
+                    <a:rPr kumimoji="1" lang="en-US" altLang="zh-TW" dirty="0" err="1">
+                      <a:solidFill>
+                        <a:schemeClr val="tx1"/>
+                      </a:solidFill>
+                    </a:rPr>
+                    <a:t>wsaw</a:t>
+                  </a:r>
+                  <a:endParaRPr kumimoji="1" lang="zh-TW" altLang="en-US" dirty="0">
+                    <a:solidFill>
+                      <a:schemeClr val="tx1"/>
+                    </a:solidFill>
+                  </a:endParaRPr>
+                </a:p>
+              </p:txBody>
+            </p:sp>
+            <p:sp>
+              <p:nvSpPr>
+                <p:cNvPr id="23" name="橢圓 22">
+                  <a:extLst>
+                    <a:ext uri="{FF2B5EF4-FFF2-40B4-BE49-F238E27FC236}">
+                      <a16:creationId xmlns:a16="http://schemas.microsoft.com/office/drawing/2014/main" id="{51080C82-1954-6648-9FFD-C35D9CF4254A}"/>
+                    </a:ext>
+                  </a:extLst>
+                </p:cNvPr>
+                <p:cNvSpPr/>
+                <p:nvPr/>
+              </p:nvSpPr>
+              <p:spPr>
+                <a:xfrm>
+                  <a:off x="10126730" y="2716922"/>
+                  <a:ext cx="1135117" cy="420413"/>
+                </a:xfrm>
+                <a:prstGeom prst="ellipse">
+                  <a:avLst/>
+                </a:prstGeom>
+                <a:solidFill>
+                  <a:schemeClr val="accent6">
+                    <a:lumMod val="60000"/>
+                    <a:lumOff val="40000"/>
+                  </a:schemeClr>
+                </a:solidFill>
+              </p:spPr>
+              <p:style>
+                <a:lnRef idx="2">
+                  <a:schemeClr val="accent1">
+                    <a:shade val="50000"/>
+                  </a:schemeClr>
+                </a:lnRef>
+                <a:fillRef idx="1">
+                  <a:schemeClr val="accent1"/>
+                </a:fillRef>
+                <a:effectRef idx="0">
+                  <a:schemeClr val="accent1"/>
+                </a:effectRef>
+                <a:fontRef idx="minor">
+                  <a:schemeClr val="lt1"/>
+                </a:fontRef>
+              </p:style>
+              <p:txBody>
+                <a:bodyPr rtlCol="0" anchor="ctr"/>
+                <a:lstStyle/>
+                <a:p>
+                  <a:pPr algn="ctr"/>
+                  <a:r>
+                    <a:rPr kumimoji="1" lang="en-US" altLang="zh-TW" sz="1000" dirty="0" err="1">
+                      <a:solidFill>
+                        <a:schemeClr val="tx1"/>
+                      </a:solidFill>
+                    </a:rPr>
+                    <a:t>Wiresaw</a:t>
+                  </a:r>
+                  <a:r>
+                    <a:rPr kumimoji="1" lang="en-US" altLang="zh-TW" sz="1000" dirty="0">
+                      <a:solidFill>
+                        <a:schemeClr val="tx1"/>
+                      </a:solidFill>
+                    </a:rPr>
+                    <a:t> Prediction HTMLs</a:t>
+                  </a:r>
+                  <a:endParaRPr kumimoji="1" lang="zh-TW" altLang="en-US" sz="1000" dirty="0">
+                    <a:solidFill>
+                      <a:schemeClr val="tx1"/>
+                    </a:solidFill>
+                  </a:endParaRPr>
+                </a:p>
+              </p:txBody>
+            </p:sp>
+            <p:cxnSp>
+              <p:nvCxnSpPr>
+                <p:cNvPr id="100" name="肘形接點 99">
+                  <a:extLst>
+                    <a:ext uri="{FF2B5EF4-FFF2-40B4-BE49-F238E27FC236}">
+                      <a16:creationId xmlns:a16="http://schemas.microsoft.com/office/drawing/2014/main" id="{B4D530FB-3954-4141-8005-CDE0EFCA7B72}"/>
+                    </a:ext>
+                  </a:extLst>
+                </p:cNvPr>
+                <p:cNvCxnSpPr>
+                  <a:cxnSpLocks/>
+                  <a:stCxn id="14" idx="2"/>
+                  <a:endCxn id="23" idx="2"/>
+                </p:cNvCxnSpPr>
+                <p:nvPr/>
+              </p:nvCxnSpPr>
+              <p:spPr>
+                <a:xfrm rot="10800000" flipV="1">
+                  <a:off x="10126731" y="2060027"/>
+                  <a:ext cx="81455" cy="867101"/>
+                </a:xfrm>
+                <a:prstGeom prst="bentConnector3">
+                  <a:avLst>
+                    <a:gd name="adj1" fmla="val 541015"/>
+                  </a:avLst>
+                </a:prstGeom>
+                <a:ln w="9525">
+                  <a:tailEnd type="triangle"/>
+                </a:ln>
+              </p:spPr>
+              <p:style>
+                <a:lnRef idx="1">
+                  <a:schemeClr val="accent1"/>
+                </a:lnRef>
+                <a:fillRef idx="0">
+                  <a:schemeClr val="accent1"/>
+                </a:fillRef>
+                <a:effectRef idx="0">
+                  <a:schemeClr val="accent1"/>
+                </a:effectRef>
+                <a:fontRef idx="minor">
+                  <a:schemeClr val="tx1"/>
+                </a:fontRef>
+              </p:style>
+            </p:cxnSp>
+          </p:grpSp>
+          <p:sp>
+            <p:nvSpPr>
+              <p:cNvPr id="61" name="剪去並圓角化單一角落矩形 60">
+                <a:extLst>
+                  <a:ext uri="{FF2B5EF4-FFF2-40B4-BE49-F238E27FC236}">
+                    <a16:creationId xmlns:a16="http://schemas.microsoft.com/office/drawing/2014/main" id="{3794B980-F2D7-3D44-B222-9840E823420A}"/>
+                  </a:ext>
+                </a:extLst>
+              </p:cNvPr>
+              <p:cNvSpPr/>
+              <p:nvPr/>
+            </p:nvSpPr>
+            <p:spPr>
+              <a:xfrm>
+                <a:off x="9027272" y="3332904"/>
+                <a:ext cx="972208" cy="420413"/>
+              </a:xfrm>
+              <a:prstGeom prst="snipRoundRect">
+                <a:avLst/>
+              </a:prstGeom>
+              <a:solidFill>
+                <a:schemeClr val="accent5">
+                  <a:lumMod val="60000"/>
+                  <a:lumOff val="40000"/>
+                </a:schemeClr>
+              </a:solidFill>
+            </p:spPr>
+            <p:style>
+              <a:lnRef idx="2">
+                <a:schemeClr val="accent1">
+                  <a:shade val="50000"/>
+                </a:schemeClr>
+              </a:lnRef>
+              <a:fillRef idx="1">
+                <a:schemeClr val="accent1"/>
+              </a:fillRef>
+              <a:effectRef idx="0">
+                <a:schemeClr val="accent1"/>
+              </a:effectRef>
+              <a:fontRef idx="minor">
+                <a:schemeClr val="lt1"/>
+              </a:fontRef>
+            </p:style>
+            <p:txBody>
+              <a:bodyPr rtlCol="0" anchor="ctr"/>
+              <a:lstStyle/>
+              <a:p>
+                <a:pPr algn="ctr"/>
+                <a:r>
+                  <a:rPr kumimoji="1" lang="en-US" altLang="zh-TW" sz="1000" dirty="0">
+                    <a:solidFill>
+                      <a:schemeClr val="tx1"/>
+                    </a:solidFill>
+                  </a:rPr>
+                  <a:t>WSAW_HPM</a:t>
+                </a:r>
+                <a:endParaRPr kumimoji="1" lang="zh-TW" altLang="en-US" sz="1000" dirty="0">
+                  <a:solidFill>
+                    <a:schemeClr val="tx1"/>
+                  </a:solidFill>
+                </a:endParaRPr>
+              </a:p>
+            </p:txBody>
+          </p:sp>
+          <p:sp>
+            <p:nvSpPr>
+              <p:cNvPr id="62" name="剪去並圓角化單一角落矩形 61">
+                <a:extLst>
+                  <a:ext uri="{FF2B5EF4-FFF2-40B4-BE49-F238E27FC236}">
+                    <a16:creationId xmlns:a16="http://schemas.microsoft.com/office/drawing/2014/main" id="{738DAF4C-4D7B-FE4C-AE82-6DA7F1B196D8}"/>
+                  </a:ext>
+                </a:extLst>
+              </p:cNvPr>
+              <p:cNvSpPr/>
+              <p:nvPr/>
+            </p:nvSpPr>
+            <p:spPr>
+              <a:xfrm>
+                <a:off x="9027272" y="3921483"/>
+                <a:ext cx="972208" cy="420413"/>
+              </a:xfrm>
+              <a:prstGeom prst="snipRoundRect">
+                <a:avLst/>
+              </a:prstGeom>
+              <a:solidFill>
+                <a:schemeClr val="accent5">
+                  <a:lumMod val="60000"/>
+                  <a:lumOff val="40000"/>
+                </a:schemeClr>
+              </a:solidFill>
+            </p:spPr>
+            <p:style>
+              <a:lnRef idx="2">
+                <a:schemeClr val="accent1">
+                  <a:shade val="50000"/>
+                </a:schemeClr>
+              </a:lnRef>
+              <a:fillRef idx="1">
+                <a:schemeClr val="accent1"/>
+              </a:fillRef>
+              <a:effectRef idx="0">
+                <a:schemeClr val="accent1"/>
+              </a:effectRef>
+              <a:fontRef idx="minor">
+                <a:schemeClr val="lt1"/>
+              </a:fontRef>
+            </p:style>
+            <p:txBody>
+              <a:bodyPr rtlCol="0" anchor="ctr"/>
+              <a:lstStyle/>
+              <a:p>
+                <a:pPr algn="ctr"/>
+                <a:r>
+                  <a:rPr kumimoji="1" lang="en-US" altLang="zh-TW" sz="1000" dirty="0">
+                    <a:solidFill>
+                      <a:schemeClr val="tx1"/>
+                    </a:solidFill>
+                  </a:rPr>
+                  <a:t>WSAW_CM</a:t>
+                </a:r>
+                <a:endParaRPr kumimoji="1" lang="zh-TW" altLang="en-US" sz="1000" dirty="0">
+                  <a:solidFill>
+                    <a:schemeClr val="tx1"/>
+                  </a:solidFill>
+                </a:endParaRPr>
+              </a:p>
+            </p:txBody>
+          </p:sp>
+          <p:cxnSp>
+            <p:nvCxnSpPr>
+              <p:cNvPr id="64" name="肘形接點 63">
+                <a:extLst>
+                  <a:ext uri="{FF2B5EF4-FFF2-40B4-BE49-F238E27FC236}">
+                    <a16:creationId xmlns:a16="http://schemas.microsoft.com/office/drawing/2014/main" id="{2B285E46-00B2-184C-9D4A-08632EDA995C}"/>
+                  </a:ext>
+                </a:extLst>
+              </p:cNvPr>
+              <p:cNvCxnSpPr>
+                <a:cxnSpLocks/>
+                <a:stCxn id="14" idx="2"/>
+                <a:endCxn id="61" idx="2"/>
+              </p:cNvCxnSpPr>
+              <p:nvPr/>
+            </p:nvCxnSpPr>
+            <p:spPr>
+              <a:xfrm rot="10800000" flipV="1">
+                <a:off x="9027273" y="2092685"/>
+                <a:ext cx="81455" cy="1450426"/>
+              </a:xfrm>
+              <a:prstGeom prst="bentConnector3">
+                <a:avLst>
+                  <a:gd name="adj1" fmla="val 538756"/>
+                </a:avLst>
+              </a:prstGeom>
+              <a:ln w="9525">
+                <a:tailEnd type="triangle"/>
+              </a:ln>
+            </p:spPr>
+            <p:style>
+              <a:lnRef idx="1">
+                <a:schemeClr val="accent1"/>
+              </a:lnRef>
+              <a:fillRef idx="0">
+                <a:schemeClr val="accent1"/>
+              </a:fillRef>
+              <a:effectRef idx="0">
+                <a:schemeClr val="accent1"/>
+              </a:effectRef>
+              <a:fontRef idx="minor">
+                <a:schemeClr val="tx1"/>
+              </a:fontRef>
+            </p:style>
+          </p:cxnSp>
+          <p:cxnSp>
+            <p:nvCxnSpPr>
+              <p:cNvPr id="65" name="肘形接點 64">
+                <a:extLst>
+                  <a:ext uri="{FF2B5EF4-FFF2-40B4-BE49-F238E27FC236}">
+                    <a16:creationId xmlns:a16="http://schemas.microsoft.com/office/drawing/2014/main" id="{7D532E3E-D3A7-5A43-8B16-9BD655FCA1B0}"/>
+                  </a:ext>
+                </a:extLst>
+              </p:cNvPr>
+              <p:cNvCxnSpPr>
+                <a:cxnSpLocks/>
+                <a:stCxn id="14" idx="2"/>
+                <a:endCxn id="62" idx="2"/>
+              </p:cNvCxnSpPr>
+              <p:nvPr/>
+            </p:nvCxnSpPr>
+            <p:spPr>
+              <a:xfrm rot="10800000" flipV="1">
+                <a:off x="9027273" y="2092684"/>
+                <a:ext cx="81455" cy="2039005"/>
+              </a:xfrm>
+              <a:prstGeom prst="bentConnector3">
+                <a:avLst>
+                  <a:gd name="adj1" fmla="val 538756"/>
+                </a:avLst>
+              </a:prstGeom>
+              <a:ln w="9525">
+                <a:tailEnd type="triangle"/>
+              </a:ln>
+            </p:spPr>
+            <p:style>
+              <a:lnRef idx="1">
+                <a:schemeClr val="accent1"/>
+              </a:lnRef>
+              <a:fillRef idx="0">
+                <a:schemeClr val="accent1"/>
+              </a:fillRef>
+              <a:effectRef idx="0">
+                <a:schemeClr val="accent1"/>
+              </a:effectRef>
+              <a:fontRef idx="minor">
+                <a:schemeClr val="tx1"/>
+              </a:fontRef>
+            </p:style>
+          </p:cxnSp>
+        </p:grpSp>
+        <p:sp>
+          <p:nvSpPr>
+            <p:cNvPr id="55" name="橢圓 54">
+              <a:extLst>
+                <a:ext uri="{FF2B5EF4-FFF2-40B4-BE49-F238E27FC236}">
+                  <a16:creationId xmlns:a16="http://schemas.microsoft.com/office/drawing/2014/main" id="{56E3D203-B349-1F46-BC06-D9090F51A411}"/>
+                </a:ext>
+              </a:extLst>
+            </p:cNvPr>
+            <p:cNvSpPr/>
+            <p:nvPr/>
+          </p:nvSpPr>
+          <p:spPr>
+            <a:xfrm>
+              <a:off x="618230" y="3518396"/>
+              <a:ext cx="1994503" cy="420413"/>
+            </a:xfrm>
+            <a:prstGeom prst="ellipse">
+              <a:avLst/>
+            </a:prstGeom>
+            <a:solidFill>
+              <a:schemeClr val="accent6">
+                <a:lumMod val="60000"/>
+                <a:lumOff val="40000"/>
+              </a:schemeClr>
+            </a:solidFill>
+          </p:spPr>
+          <p:style>
+            <a:lnRef idx="2">
+              <a:schemeClr val="accent1">
+                <a:shade val="50000"/>
+              </a:schemeClr>
+            </a:lnRef>
+            <a:fillRef idx="1">
+              <a:schemeClr val="accent1"/>
+            </a:fillRef>
+            <a:effectRef idx="0">
+              <a:schemeClr val="accent1"/>
+            </a:effectRef>
+            <a:fontRef idx="minor">
+              <a:schemeClr val="lt1"/>
+            </a:fontRef>
+          </p:style>
+          <p:txBody>
+            <a:bodyPr rtlCol="0" anchor="ctr"/>
+            <a:lstStyle/>
+            <a:p>
+              <a:pPr algn="ctr"/>
+              <a:r>
+                <a:rPr kumimoji="1" lang="en-US" altLang="zh-TW" sz="1400" dirty="0" err="1">
+                  <a:solidFill>
+                    <a:schemeClr val="tx1"/>
+                  </a:solidFill>
+                </a:rPr>
+                <a:t>gw_image.pptx</a:t>
+              </a:r>
+              <a:endParaRPr kumimoji="1" lang="zh-TW" altLang="en-US" sz="1400" dirty="0">
+                <a:solidFill>
+                  <a:schemeClr val="tx1"/>
+                </a:solidFill>
+              </a:endParaRPr>
+            </a:p>
+          </p:txBody>
+        </p:sp>
+        <p:cxnSp>
+          <p:nvCxnSpPr>
+            <p:cNvPr id="54" name="肘形接點 53">
+              <a:extLst>
+                <a:ext uri="{FF2B5EF4-FFF2-40B4-BE49-F238E27FC236}">
+                  <a16:creationId xmlns:a16="http://schemas.microsoft.com/office/drawing/2014/main" id="{7576735C-A1A5-E84C-B81A-12566D47CA96}"/>
+                </a:ext>
+              </a:extLst>
+            </p:cNvPr>
+            <p:cNvCxnSpPr>
+              <a:cxnSpLocks/>
+              <a:stCxn id="7" idx="2"/>
+              <a:endCxn id="14" idx="3"/>
+            </p:cNvCxnSpPr>
+            <p:nvPr/>
+          </p:nvCxnSpPr>
+          <p:spPr>
+            <a:xfrm rot="10800000" flipH="1" flipV="1">
+              <a:off x="4145203" y="994353"/>
+              <a:ext cx="7174251" cy="767255"/>
+            </a:xfrm>
+            <a:prstGeom prst="bentConnector4">
+              <a:avLst>
+                <a:gd name="adj1" fmla="val -6270"/>
+                <a:gd name="adj2" fmla="val 71575"/>
+              </a:avLst>
+            </a:prstGeom>
+            <a:ln w="12700">
+              <a:tailEnd type="triangle"/>
+            </a:ln>
+          </p:spPr>
+          <p:style>
+            <a:lnRef idx="1">
+              <a:schemeClr val="accent1"/>
+            </a:lnRef>
+            <a:fillRef idx="0">
+              <a:schemeClr val="accent1"/>
+            </a:fillRef>
+            <a:effectRef idx="0">
+              <a:schemeClr val="accent1"/>
+            </a:effectRef>
+            <a:fontRef idx="minor">
+              <a:schemeClr val="tx1"/>
+            </a:fontRef>
+          </p:style>
+        </p:cxnSp>
+        <p:grpSp>
+          <p:nvGrpSpPr>
+            <p:cNvPr id="60" name="群組 59">
+              <a:extLst>
+                <a:ext uri="{FF2B5EF4-FFF2-40B4-BE49-F238E27FC236}">
+                  <a16:creationId xmlns:a16="http://schemas.microsoft.com/office/drawing/2014/main" id="{95A1882B-FA42-0844-8E9E-CBBDA97CC7FC}"/>
+                </a:ext>
+              </a:extLst>
+            </p:cNvPr>
+            <p:cNvGrpSpPr/>
+            <p:nvPr/>
+          </p:nvGrpSpPr>
+          <p:grpSpPr>
+            <a:xfrm>
+              <a:off x="2670234" y="1640204"/>
+              <a:ext cx="1627600" cy="3960091"/>
+              <a:chOff x="4747541" y="1640205"/>
+              <a:chExt cx="1627600" cy="3960091"/>
+            </a:xfrm>
+          </p:grpSpPr>
+          <p:sp>
+            <p:nvSpPr>
+              <p:cNvPr id="66" name="圓角矩形 65">
+                <a:extLst>
+                  <a:ext uri="{FF2B5EF4-FFF2-40B4-BE49-F238E27FC236}">
+                    <a16:creationId xmlns:a16="http://schemas.microsoft.com/office/drawing/2014/main" id="{05AFBC0E-E046-274C-B749-C9F79D751C89}"/>
+                  </a:ext>
+                </a:extLst>
+              </p:cNvPr>
+              <p:cNvSpPr/>
+              <p:nvPr/>
+            </p:nvSpPr>
+            <p:spPr>
+              <a:xfrm>
+                <a:off x="4747541" y="1640205"/>
+                <a:ext cx="1627600" cy="3960091"/>
+              </a:xfrm>
+              <a:prstGeom prst="roundRect">
+                <a:avLst/>
+              </a:prstGeom>
+              <a:solidFill>
+                <a:schemeClr val="accent4">
+                  <a:lumMod val="40000"/>
+                  <a:lumOff val="60000"/>
+                </a:schemeClr>
+              </a:solidFill>
+              <a:ln>
+                <a:noFill/>
+              </a:ln>
+            </p:spPr>
+            <p:style>
+              <a:lnRef idx="2">
+                <a:schemeClr val="accent1">
+                  <a:shade val="50000"/>
+                </a:schemeClr>
+              </a:lnRef>
+              <a:fillRef idx="1">
+                <a:schemeClr val="accent1"/>
+              </a:fillRef>
+              <a:effectRef idx="0">
+                <a:schemeClr val="accent1"/>
+              </a:effectRef>
+              <a:fontRef idx="minor">
+                <a:schemeClr val="lt1"/>
+              </a:fontRef>
+            </p:style>
+            <p:txBody>
+              <a:bodyPr rtlCol="0" anchor="ctr"/>
+              <a:lstStyle/>
+              <a:p>
+                <a:pPr algn="ctr"/>
+                <a:endParaRPr kumimoji="1" lang="zh-TW" altLang="en-US"/>
+              </a:p>
+            </p:txBody>
+          </p:sp>
+          <p:grpSp>
+            <p:nvGrpSpPr>
+              <p:cNvPr id="67" name="群組 66">
+                <a:extLst>
+                  <a:ext uri="{FF2B5EF4-FFF2-40B4-BE49-F238E27FC236}">
+                    <a16:creationId xmlns:a16="http://schemas.microsoft.com/office/drawing/2014/main" id="{DE117C0E-3C3B-9E45-AAF0-D271F6C9C8E0}"/>
+                  </a:ext>
+                </a:extLst>
+              </p:cNvPr>
+              <p:cNvGrpSpPr/>
+              <p:nvPr/>
+            </p:nvGrpSpPr>
+            <p:grpSpPr>
+              <a:xfrm>
+                <a:off x="5201498" y="1761609"/>
+                <a:ext cx="1135117" cy="1408384"/>
+                <a:chOff x="6300956" y="1728952"/>
+                <a:chExt cx="1135117" cy="1408384"/>
+              </a:xfrm>
+            </p:grpSpPr>
+            <p:sp>
+              <p:nvSpPr>
+                <p:cNvPr id="68" name="剪去並圓角化單一角落矩形 67">
+                  <a:extLst>
+                    <a:ext uri="{FF2B5EF4-FFF2-40B4-BE49-F238E27FC236}">
+                      <a16:creationId xmlns:a16="http://schemas.microsoft.com/office/drawing/2014/main" id="{E365B243-3A55-BD47-B2FB-0FE326E80F20}"/>
+                    </a:ext>
+                  </a:extLst>
+                </p:cNvPr>
+                <p:cNvSpPr/>
+                <p:nvPr/>
+              </p:nvSpPr>
+              <p:spPr>
+                <a:xfrm>
+                  <a:off x="6382411" y="1728952"/>
+                  <a:ext cx="972208" cy="662152"/>
+                </a:xfrm>
+                <a:prstGeom prst="snipRoundRect">
+                  <a:avLst/>
+                </a:prstGeom>
+                <a:solidFill>
+                  <a:srgbClr val="FFC000"/>
+                </a:solidFill>
+              </p:spPr>
+              <p:style>
+                <a:lnRef idx="2">
+                  <a:schemeClr val="accent1">
+                    <a:shade val="50000"/>
+                  </a:schemeClr>
+                </a:lnRef>
+                <a:fillRef idx="1">
+                  <a:schemeClr val="accent1"/>
+                </a:fillRef>
+                <a:effectRef idx="0">
+                  <a:schemeClr val="accent1"/>
+                </a:effectRef>
+                <a:fontRef idx="minor">
+                  <a:schemeClr val="lt1"/>
+                </a:fontRef>
+              </p:style>
+              <p:txBody>
+                <a:bodyPr rtlCol="0" anchor="ctr"/>
+                <a:lstStyle/>
+                <a:p>
+                  <a:pPr algn="ctr"/>
+                  <a:r>
+                    <a:rPr kumimoji="1" lang="en-US" altLang="zh-TW" dirty="0">
+                      <a:solidFill>
+                        <a:schemeClr val="tx1"/>
+                      </a:solidFill>
+                    </a:rPr>
+                    <a:t>styles</a:t>
+                  </a:r>
+                  <a:endParaRPr kumimoji="1" lang="zh-TW" altLang="en-US" dirty="0">
+                    <a:solidFill>
+                      <a:schemeClr val="tx1"/>
+                    </a:solidFill>
+                  </a:endParaRPr>
+                </a:p>
+              </p:txBody>
+            </p:sp>
+            <p:sp>
+              <p:nvSpPr>
+                <p:cNvPr id="70" name="橢圓 69">
+                  <a:extLst>
+                    <a:ext uri="{FF2B5EF4-FFF2-40B4-BE49-F238E27FC236}">
+                      <a16:creationId xmlns:a16="http://schemas.microsoft.com/office/drawing/2014/main" id="{41D90140-87CB-6B49-A4E4-459FF56F9872}"/>
+                    </a:ext>
+                  </a:extLst>
+                </p:cNvPr>
+                <p:cNvSpPr/>
+                <p:nvPr/>
+              </p:nvSpPr>
+              <p:spPr>
+                <a:xfrm>
+                  <a:off x="6300956" y="2716923"/>
+                  <a:ext cx="1135117" cy="420413"/>
+                </a:xfrm>
+                <a:prstGeom prst="ellipse">
+                  <a:avLst/>
+                </a:prstGeom>
+                <a:solidFill>
+                  <a:schemeClr val="accent6">
+                    <a:lumMod val="60000"/>
+                    <a:lumOff val="40000"/>
+                  </a:schemeClr>
+                </a:solidFill>
+              </p:spPr>
+              <p:style>
+                <a:lnRef idx="2">
+                  <a:schemeClr val="accent1">
+                    <a:shade val="50000"/>
+                  </a:schemeClr>
+                </a:lnRef>
+                <a:fillRef idx="1">
+                  <a:schemeClr val="accent1"/>
+                </a:fillRef>
+                <a:effectRef idx="0">
+                  <a:schemeClr val="accent1"/>
+                </a:effectRef>
+                <a:fontRef idx="minor">
+                  <a:schemeClr val="lt1"/>
+                </a:fontRef>
+              </p:style>
+              <p:txBody>
+                <a:bodyPr rtlCol="0" anchor="ctr"/>
+                <a:lstStyle/>
+                <a:p>
+                  <a:pPr algn="ctr"/>
+                  <a:r>
+                    <a:rPr kumimoji="1" lang="en-US" altLang="zh-TW" sz="1200" dirty="0">
+                      <a:solidFill>
+                        <a:schemeClr val="tx1"/>
+                      </a:solidFill>
+                    </a:rPr>
+                    <a:t>website </a:t>
+                  </a:r>
+                  <a:r>
+                    <a:rPr kumimoji="1" lang="en-US" altLang="zh-TW" sz="1200" dirty="0" err="1">
+                      <a:solidFill>
+                        <a:schemeClr val="tx1"/>
+                      </a:solidFill>
+                    </a:rPr>
+                    <a:t>css</a:t>
+                  </a:r>
+                  <a:r>
+                    <a:rPr kumimoji="1" lang="en-US" altLang="zh-TW" sz="1200" dirty="0">
+                      <a:solidFill>
+                        <a:schemeClr val="tx1"/>
+                      </a:solidFill>
+                    </a:rPr>
+                    <a:t> script</a:t>
+                  </a:r>
+                  <a:endParaRPr kumimoji="1" lang="zh-TW" altLang="en-US" sz="1200" dirty="0">
+                    <a:solidFill>
+                      <a:schemeClr val="tx1"/>
+                    </a:solidFill>
+                  </a:endParaRPr>
+                </a:p>
+              </p:txBody>
+            </p:sp>
+            <p:cxnSp>
+              <p:nvCxnSpPr>
+                <p:cNvPr id="72" name="肘形接點 71">
+                  <a:extLst>
+                    <a:ext uri="{FF2B5EF4-FFF2-40B4-BE49-F238E27FC236}">
+                      <a16:creationId xmlns:a16="http://schemas.microsoft.com/office/drawing/2014/main" id="{00C4DC5C-C510-9C4F-8112-C0F209E53C0A}"/>
+                    </a:ext>
+                  </a:extLst>
+                </p:cNvPr>
+                <p:cNvCxnSpPr>
+                  <a:cxnSpLocks/>
+                  <a:stCxn id="68" idx="2"/>
+                  <a:endCxn id="70" idx="2"/>
+                </p:cNvCxnSpPr>
+                <p:nvPr/>
+              </p:nvCxnSpPr>
+              <p:spPr>
+                <a:xfrm rot="10800000" flipV="1">
+                  <a:off x="6300957" y="2060028"/>
+                  <a:ext cx="81455" cy="867102"/>
+                </a:xfrm>
+                <a:prstGeom prst="bentConnector3">
+                  <a:avLst>
+                    <a:gd name="adj1" fmla="val 472285"/>
+                  </a:avLst>
+                </a:prstGeom>
+                <a:ln w="9525">
+                  <a:tailEnd type="triangle"/>
+                </a:ln>
+              </p:spPr>
+              <p:style>
+                <a:lnRef idx="1">
+                  <a:schemeClr val="accent1"/>
+                </a:lnRef>
+                <a:fillRef idx="0">
+                  <a:schemeClr val="accent1"/>
+                </a:fillRef>
+                <a:effectRef idx="0">
+                  <a:schemeClr val="accent1"/>
+                </a:effectRef>
+                <a:fontRef idx="minor">
+                  <a:schemeClr val="tx1"/>
+                </a:fontRef>
+              </p:style>
+            </p:cxnSp>
+          </p:grpSp>
+        </p:grpSp>
+        <p:cxnSp>
+          <p:nvCxnSpPr>
+            <p:cNvPr id="75" name="肘形接點 74">
+              <a:extLst>
+                <a:ext uri="{FF2B5EF4-FFF2-40B4-BE49-F238E27FC236}">
+                  <a16:creationId xmlns:a16="http://schemas.microsoft.com/office/drawing/2014/main" id="{E2C26C1A-F679-3441-A7AA-B6EBE42E0FED}"/>
+                </a:ext>
+              </a:extLst>
+            </p:cNvPr>
+            <p:cNvCxnSpPr>
+              <a:cxnSpLocks/>
+              <a:stCxn id="7" idx="2"/>
+              <a:endCxn id="68" idx="3"/>
+            </p:cNvCxnSpPr>
+            <p:nvPr/>
+          </p:nvCxnSpPr>
+          <p:spPr>
+            <a:xfrm rot="10800000" flipV="1">
+              <a:off x="3691750" y="994354"/>
+              <a:ext cx="453454" cy="767254"/>
+            </a:xfrm>
+            <a:prstGeom prst="bentConnector2">
+              <a:avLst/>
+            </a:prstGeom>
+            <a:ln w="12700">
+              <a:tailEnd type="triangle"/>
+            </a:ln>
+          </p:spPr>
+          <p:style>
+            <a:lnRef idx="1">
+              <a:schemeClr val="accent1"/>
+            </a:lnRef>
+            <a:fillRef idx="0">
+              <a:schemeClr val="accent1"/>
+            </a:fillRef>
+            <a:effectRef idx="0">
+              <a:schemeClr val="accent1"/>
+            </a:effectRef>
+            <a:fontRef idx="minor">
+              <a:schemeClr val="tx1"/>
+            </a:fontRef>
+          </p:style>
+        </p:cxnSp>
+        <p:cxnSp>
+          <p:nvCxnSpPr>
+            <p:cNvPr id="80" name="肘形接點 79">
+              <a:extLst>
+                <a:ext uri="{FF2B5EF4-FFF2-40B4-BE49-F238E27FC236}">
+                  <a16:creationId xmlns:a16="http://schemas.microsoft.com/office/drawing/2014/main" id="{CFDB7C9A-0E9C-4948-9106-0FAA11CDB5A4}"/>
+                </a:ext>
+              </a:extLst>
+            </p:cNvPr>
+            <p:cNvCxnSpPr>
+              <a:cxnSpLocks/>
+              <a:stCxn id="7" idx="2"/>
+              <a:endCxn id="55" idx="2"/>
+            </p:cNvCxnSpPr>
+            <p:nvPr/>
+          </p:nvCxnSpPr>
+          <p:spPr>
+            <a:xfrm rot="10800000" flipV="1">
+              <a:off x="618230" y="994353"/>
+              <a:ext cx="3526974" cy="2734249"/>
+            </a:xfrm>
+            <a:prstGeom prst="bentConnector3">
+              <a:avLst>
+                <a:gd name="adj1" fmla="val 106481"/>
+              </a:avLst>
+            </a:prstGeom>
+            <a:ln w="12700">
+              <a:tailEnd type="triangle"/>
+            </a:ln>
+          </p:spPr>
+          <p:style>
+            <a:lnRef idx="1">
+              <a:schemeClr val="accent1"/>
+            </a:lnRef>
+            <a:fillRef idx="0">
+              <a:schemeClr val="accent1"/>
+            </a:fillRef>
+            <a:effectRef idx="0">
+              <a:schemeClr val="accent1"/>
+            </a:effectRef>
+            <a:fontRef idx="minor">
+              <a:schemeClr val="tx1"/>
+            </a:fontRef>
+          </p:style>
+        </p:cxnSp>
+        <p:cxnSp>
+          <p:nvCxnSpPr>
+            <p:cNvPr id="83" name="肘形接點 82">
+              <a:extLst>
+                <a:ext uri="{FF2B5EF4-FFF2-40B4-BE49-F238E27FC236}">
+                  <a16:creationId xmlns:a16="http://schemas.microsoft.com/office/drawing/2014/main" id="{53605975-972E-4646-ABEA-E8350ABAF978}"/>
+                </a:ext>
+              </a:extLst>
+            </p:cNvPr>
+            <p:cNvCxnSpPr>
+              <a:cxnSpLocks/>
+              <a:stCxn id="7" idx="2"/>
+              <a:endCxn id="9" idx="2"/>
+            </p:cNvCxnSpPr>
+            <p:nvPr/>
+          </p:nvCxnSpPr>
+          <p:spPr>
+            <a:xfrm rot="10800000" flipV="1">
+              <a:off x="734598" y="994354"/>
+              <a:ext cx="3410607" cy="1560786"/>
+            </a:xfrm>
+            <a:prstGeom prst="bentConnector3">
+              <a:avLst>
+                <a:gd name="adj1" fmla="val 110097"/>
+              </a:avLst>
+            </a:prstGeom>
+            <a:ln w="12700">
+              <a:tailEnd type="triangle"/>
+            </a:ln>
+          </p:spPr>
+          <p:style>
+            <a:lnRef idx="1">
+              <a:schemeClr val="accent1"/>
+            </a:lnRef>
+            <a:fillRef idx="0">
+              <a:schemeClr val="accent1"/>
+            </a:fillRef>
+            <a:effectRef idx="0">
+              <a:schemeClr val="accent1"/>
+            </a:effectRef>
+            <a:fontRef idx="minor">
+              <a:schemeClr val="tx1"/>
+            </a:fontRef>
+          </p:style>
+        </p:cxnSp>
+        <p:grpSp>
+          <p:nvGrpSpPr>
+            <p:cNvPr id="71" name="群組 70">
+              <a:extLst>
+                <a:ext uri="{FF2B5EF4-FFF2-40B4-BE49-F238E27FC236}">
+                  <a16:creationId xmlns:a16="http://schemas.microsoft.com/office/drawing/2014/main" id="{6731703F-C55D-9746-A851-882F935370C0}"/>
+                </a:ext>
+              </a:extLst>
+            </p:cNvPr>
+            <p:cNvGrpSpPr/>
+            <p:nvPr/>
+          </p:nvGrpSpPr>
+          <p:grpSpPr>
+            <a:xfrm>
+              <a:off x="6471340" y="1640204"/>
+              <a:ext cx="1627600" cy="3960091"/>
+              <a:chOff x="2847177" y="1640206"/>
+              <a:chExt cx="1627600" cy="3960091"/>
+            </a:xfrm>
+          </p:grpSpPr>
+          <p:sp>
+            <p:nvSpPr>
+              <p:cNvPr id="74" name="圓角矩形 73">
+                <a:extLst>
+                  <a:ext uri="{FF2B5EF4-FFF2-40B4-BE49-F238E27FC236}">
+                    <a16:creationId xmlns:a16="http://schemas.microsoft.com/office/drawing/2014/main" id="{126747EF-CBB8-D74C-990B-38EBAA51A5DA}"/>
+                  </a:ext>
+                </a:extLst>
+              </p:cNvPr>
+              <p:cNvSpPr/>
+              <p:nvPr/>
+            </p:nvSpPr>
+            <p:spPr>
+              <a:xfrm>
+                <a:off x="2847177" y="1640206"/>
+                <a:ext cx="1627600" cy="3960091"/>
+              </a:xfrm>
+              <a:prstGeom prst="roundRect">
+                <a:avLst/>
+              </a:prstGeom>
+              <a:solidFill>
+                <a:schemeClr val="accent4">
+                  <a:lumMod val="40000"/>
+                  <a:lumOff val="60000"/>
+                </a:schemeClr>
+              </a:solidFill>
+              <a:ln>
+                <a:noFill/>
+              </a:ln>
+            </p:spPr>
+            <p:style>
+              <a:lnRef idx="2">
+                <a:schemeClr val="accent1">
+                  <a:shade val="50000"/>
+                </a:schemeClr>
+              </a:lnRef>
+              <a:fillRef idx="1">
+                <a:schemeClr val="accent1"/>
+              </a:fillRef>
+              <a:effectRef idx="0">
+                <a:schemeClr val="accent1"/>
+              </a:effectRef>
+              <a:fontRef idx="minor">
+                <a:schemeClr val="lt1"/>
+              </a:fontRef>
+            </p:style>
+            <p:txBody>
+              <a:bodyPr rtlCol="0" anchor="ctr"/>
+              <a:lstStyle/>
+              <a:p>
+                <a:pPr algn="ctr"/>
+                <a:endParaRPr kumimoji="1" lang="zh-TW" altLang="en-US"/>
+              </a:p>
+            </p:txBody>
+          </p:sp>
+          <p:grpSp>
+            <p:nvGrpSpPr>
+              <p:cNvPr id="76" name="群組 75">
+                <a:extLst>
+                  <a:ext uri="{FF2B5EF4-FFF2-40B4-BE49-F238E27FC236}">
+                    <a16:creationId xmlns:a16="http://schemas.microsoft.com/office/drawing/2014/main" id="{9AB3AD24-5B21-8C47-8E3B-B9256FA8B8EC}"/>
+                  </a:ext>
+                </a:extLst>
+              </p:cNvPr>
+              <p:cNvGrpSpPr/>
+              <p:nvPr/>
+            </p:nvGrpSpPr>
+            <p:grpSpPr>
+              <a:xfrm>
+                <a:off x="3288611" y="1761610"/>
+                <a:ext cx="1135117" cy="3752189"/>
+                <a:chOff x="4388069" y="1728953"/>
+                <a:chExt cx="1135117" cy="3752189"/>
+              </a:xfrm>
+            </p:grpSpPr>
+            <p:sp>
+              <p:nvSpPr>
+                <p:cNvPr id="78" name="剪去並圓角化單一角落矩形 77">
+                  <a:extLst>
+                    <a:ext uri="{FF2B5EF4-FFF2-40B4-BE49-F238E27FC236}">
+                      <a16:creationId xmlns:a16="http://schemas.microsoft.com/office/drawing/2014/main" id="{C6E02F17-3095-5947-8328-34BE7D5E2519}"/>
+                    </a:ext>
+                  </a:extLst>
+                </p:cNvPr>
+                <p:cNvSpPr/>
+                <p:nvPr/>
+              </p:nvSpPr>
+              <p:spPr>
+                <a:xfrm>
+                  <a:off x="4469524" y="1728953"/>
+                  <a:ext cx="972208" cy="662152"/>
+                </a:xfrm>
+                <a:prstGeom prst="snipRoundRect">
+                  <a:avLst/>
+                </a:prstGeom>
+                <a:solidFill>
+                  <a:srgbClr val="FFC000"/>
+                </a:solidFill>
+              </p:spPr>
+              <p:style>
+                <a:lnRef idx="2">
+                  <a:schemeClr val="accent1">
+                    <a:shade val="50000"/>
+                  </a:schemeClr>
+                </a:lnRef>
+                <a:fillRef idx="1">
+                  <a:schemeClr val="accent1"/>
+                </a:fillRef>
+                <a:effectRef idx="0">
+                  <a:schemeClr val="accent1"/>
+                </a:effectRef>
+                <a:fontRef idx="minor">
+                  <a:schemeClr val="lt1"/>
+                </a:fontRef>
+              </p:style>
+              <p:txBody>
+                <a:bodyPr rtlCol="0" anchor="ctr"/>
+                <a:lstStyle/>
+                <a:p>
+                  <a:pPr algn="ctr"/>
+                  <a:r>
+                    <a:rPr kumimoji="1" lang="en-US" altLang="zh-TW" dirty="0" err="1">
+                      <a:solidFill>
+                        <a:schemeClr val="tx1"/>
+                      </a:solidFill>
+                    </a:rPr>
+                    <a:t>img</a:t>
+                  </a:r>
+                  <a:endParaRPr kumimoji="1" lang="zh-TW" altLang="en-US" dirty="0">
+                    <a:solidFill>
+                      <a:schemeClr val="tx1"/>
+                    </a:solidFill>
+                  </a:endParaRPr>
+                </a:p>
+              </p:txBody>
+            </p:sp>
+            <p:sp>
+              <p:nvSpPr>
+                <p:cNvPr id="79" name="剪去並圓角化單一角落矩形 78">
+                  <a:extLst>
+                    <a:ext uri="{FF2B5EF4-FFF2-40B4-BE49-F238E27FC236}">
+                      <a16:creationId xmlns:a16="http://schemas.microsoft.com/office/drawing/2014/main" id="{39D4E373-C110-C04B-AFCE-2C9F1FCE2943}"/>
+                    </a:ext>
+                  </a:extLst>
+                </p:cNvPr>
+                <p:cNvSpPr/>
+                <p:nvPr/>
+              </p:nvSpPr>
+              <p:spPr>
+                <a:xfrm>
+                  <a:off x="4487918" y="2716923"/>
+                  <a:ext cx="972208" cy="420413"/>
+                </a:xfrm>
+                <a:prstGeom prst="snipRoundRect">
+                  <a:avLst/>
+                </a:prstGeom>
+                <a:solidFill>
+                  <a:srgbClr val="FFC000"/>
+                </a:solidFill>
+              </p:spPr>
+              <p:style>
+                <a:lnRef idx="2">
+                  <a:schemeClr val="accent1">
+                    <a:shade val="50000"/>
+                  </a:schemeClr>
+                </a:lnRef>
+                <a:fillRef idx="1">
+                  <a:schemeClr val="accent1"/>
+                </a:fillRef>
+                <a:effectRef idx="0">
+                  <a:schemeClr val="accent1"/>
+                </a:effectRef>
+                <a:fontRef idx="minor">
+                  <a:schemeClr val="lt1"/>
+                </a:fontRef>
+              </p:style>
+              <p:txBody>
+                <a:bodyPr rtlCol="0" anchor="ctr"/>
+                <a:lstStyle/>
+                <a:p>
+                  <a:pPr algn="ctr"/>
+                  <a:r>
+                    <a:rPr kumimoji="1" lang="en-US" altLang="zh-TW" sz="1300" dirty="0" err="1">
+                      <a:solidFill>
+                        <a:schemeClr val="tx1"/>
+                      </a:solidFill>
+                    </a:rPr>
+                    <a:t>puller_img</a:t>
+                  </a:r>
+                  <a:endParaRPr kumimoji="1" lang="zh-TW" altLang="en-US" sz="1300" dirty="0">
+                    <a:solidFill>
+                      <a:schemeClr val="tx1"/>
+                    </a:solidFill>
+                  </a:endParaRPr>
+                </a:p>
+              </p:txBody>
+            </p:sp>
+            <p:sp>
+              <p:nvSpPr>
+                <p:cNvPr id="82" name="剪去並圓角化單一角落矩形 81">
+                  <a:extLst>
+                    <a:ext uri="{FF2B5EF4-FFF2-40B4-BE49-F238E27FC236}">
+                      <a16:creationId xmlns:a16="http://schemas.microsoft.com/office/drawing/2014/main" id="{1B1077D3-C084-E44F-93D5-4A8B5EA11919}"/>
+                    </a:ext>
+                  </a:extLst>
+                </p:cNvPr>
+                <p:cNvSpPr/>
+                <p:nvPr/>
+              </p:nvSpPr>
+              <p:spPr>
+                <a:xfrm>
+                  <a:off x="4487918" y="3300247"/>
+                  <a:ext cx="972208" cy="420413"/>
+                </a:xfrm>
+                <a:prstGeom prst="snipRoundRect">
+                  <a:avLst/>
+                </a:prstGeom>
+                <a:solidFill>
+                  <a:srgbClr val="FFC000"/>
+                </a:solidFill>
+              </p:spPr>
+              <p:style>
+                <a:lnRef idx="2">
+                  <a:schemeClr val="accent1">
+                    <a:shade val="50000"/>
+                  </a:schemeClr>
+                </a:lnRef>
+                <a:fillRef idx="1">
+                  <a:schemeClr val="accent1"/>
+                </a:fillRef>
+                <a:effectRef idx="0">
+                  <a:schemeClr val="accent1"/>
+                </a:effectRef>
+                <a:fontRef idx="minor">
+                  <a:schemeClr val="lt1"/>
+                </a:fontRef>
+              </p:style>
+              <p:txBody>
+                <a:bodyPr rtlCol="0" anchor="ctr"/>
+                <a:lstStyle/>
+                <a:p>
+                  <a:pPr algn="ctr"/>
+                  <a:r>
+                    <a:rPr kumimoji="1" lang="en-US" altLang="zh-TW" sz="1300" dirty="0" err="1">
+                      <a:solidFill>
+                        <a:schemeClr val="tx1"/>
+                      </a:solidFill>
+                    </a:rPr>
+                    <a:t>wsaw_img</a:t>
+                  </a:r>
+                  <a:endParaRPr kumimoji="1" lang="zh-TW" altLang="en-US" sz="1300" dirty="0">
+                    <a:solidFill>
+                      <a:schemeClr val="tx1"/>
+                    </a:solidFill>
+                  </a:endParaRPr>
+                </a:p>
+              </p:txBody>
+            </p:sp>
+            <p:sp>
+              <p:nvSpPr>
+                <p:cNvPr id="84" name="剪去並圓角化單一角落矩形 83">
+                  <a:extLst>
+                    <a:ext uri="{FF2B5EF4-FFF2-40B4-BE49-F238E27FC236}">
+                      <a16:creationId xmlns:a16="http://schemas.microsoft.com/office/drawing/2014/main" id="{BB8DFCB2-920A-5B43-9759-6E1246ABFB55}"/>
+                    </a:ext>
+                  </a:extLst>
+                </p:cNvPr>
+                <p:cNvSpPr/>
+                <p:nvPr/>
+              </p:nvSpPr>
+              <p:spPr>
+                <a:xfrm>
+                  <a:off x="4487918" y="3888826"/>
+                  <a:ext cx="972208" cy="420413"/>
+                </a:xfrm>
+                <a:prstGeom prst="snipRoundRect">
+                  <a:avLst/>
+                </a:prstGeom>
+                <a:solidFill>
+                  <a:srgbClr val="FFC000"/>
+                </a:solidFill>
+              </p:spPr>
+              <p:style>
+                <a:lnRef idx="2">
+                  <a:schemeClr val="accent1">
+                    <a:shade val="50000"/>
+                  </a:schemeClr>
+                </a:lnRef>
+                <a:fillRef idx="1">
+                  <a:schemeClr val="accent1"/>
+                </a:fillRef>
+                <a:effectRef idx="0">
+                  <a:schemeClr val="accent1"/>
+                </a:effectRef>
+                <a:fontRef idx="minor">
+                  <a:schemeClr val="lt1"/>
+                </a:fontRef>
+              </p:style>
+              <p:txBody>
+                <a:bodyPr rtlCol="0" anchor="ctr"/>
+                <a:lstStyle/>
+                <a:p>
+                  <a:pPr algn="ctr"/>
+                  <a:r>
+                    <a:rPr kumimoji="1" lang="en-US" altLang="zh-TW" sz="1300" dirty="0" err="1">
+                      <a:solidFill>
+                        <a:schemeClr val="tx1"/>
+                      </a:solidFill>
+                    </a:rPr>
+                    <a:t>wsaw_img_intro</a:t>
+                  </a:r>
+                  <a:endParaRPr kumimoji="1" lang="zh-TW" altLang="en-US" sz="1300" dirty="0">
+                    <a:solidFill>
+                      <a:schemeClr val="tx1"/>
+                    </a:solidFill>
+                  </a:endParaRPr>
+                </a:p>
+              </p:txBody>
+            </p:sp>
+            <p:sp>
+              <p:nvSpPr>
+                <p:cNvPr id="85" name="剪去並圓角化單一角落矩形 84">
+                  <a:extLst>
+                    <a:ext uri="{FF2B5EF4-FFF2-40B4-BE49-F238E27FC236}">
+                      <a16:creationId xmlns:a16="http://schemas.microsoft.com/office/drawing/2014/main" id="{D7E9CAC9-4866-844E-BBEE-C6C4DD018078}"/>
+                    </a:ext>
+                  </a:extLst>
+                </p:cNvPr>
+                <p:cNvSpPr/>
+                <p:nvPr/>
+              </p:nvSpPr>
+              <p:spPr>
+                <a:xfrm>
+                  <a:off x="4469524" y="4477405"/>
+                  <a:ext cx="972208" cy="420413"/>
+                </a:xfrm>
+                <a:prstGeom prst="snipRoundRect">
+                  <a:avLst/>
+                </a:prstGeom>
+                <a:solidFill>
+                  <a:srgbClr val="FFC000"/>
+                </a:solidFill>
+              </p:spPr>
+              <p:style>
+                <a:lnRef idx="2">
+                  <a:schemeClr val="accent1">
+                    <a:shade val="50000"/>
+                  </a:schemeClr>
+                </a:lnRef>
+                <a:fillRef idx="1">
+                  <a:schemeClr val="accent1"/>
+                </a:fillRef>
+                <a:effectRef idx="0">
+                  <a:schemeClr val="accent1"/>
+                </a:effectRef>
+                <a:fontRef idx="minor">
+                  <a:schemeClr val="lt1"/>
+                </a:fontRef>
+              </p:style>
+              <p:txBody>
+                <a:bodyPr rtlCol="0" anchor="ctr"/>
+                <a:lstStyle/>
+                <a:p>
+                  <a:pPr algn="ctr"/>
+                  <a:r>
+                    <a:rPr kumimoji="1" lang="en-US" altLang="zh-TW" sz="1300" dirty="0" err="1">
+                      <a:solidFill>
+                        <a:schemeClr val="tx1"/>
+                      </a:solidFill>
+                    </a:rPr>
+                    <a:t>wsaw_ncu</a:t>
+                  </a:r>
+                  <a:endParaRPr kumimoji="1" lang="zh-TW" altLang="en-US" sz="1300" dirty="0">
+                    <a:solidFill>
+                      <a:schemeClr val="tx1"/>
+                    </a:solidFill>
+                  </a:endParaRPr>
+                </a:p>
+              </p:txBody>
+            </p:sp>
+            <p:sp>
+              <p:nvSpPr>
+                <p:cNvPr id="86" name="橢圓 85">
+                  <a:extLst>
+                    <a:ext uri="{FF2B5EF4-FFF2-40B4-BE49-F238E27FC236}">
+                      <a16:creationId xmlns:a16="http://schemas.microsoft.com/office/drawing/2014/main" id="{31E4C64B-1DAB-EA4C-8928-382537A6E18F}"/>
+                    </a:ext>
+                  </a:extLst>
+                </p:cNvPr>
+                <p:cNvSpPr/>
+                <p:nvPr/>
+              </p:nvSpPr>
+              <p:spPr>
+                <a:xfrm>
+                  <a:off x="4388069" y="5060729"/>
+                  <a:ext cx="1135117" cy="420413"/>
+                </a:xfrm>
+                <a:prstGeom prst="ellipse">
+                  <a:avLst/>
+                </a:prstGeom>
+                <a:solidFill>
+                  <a:schemeClr val="accent6">
+                    <a:lumMod val="60000"/>
+                    <a:lumOff val="40000"/>
+                  </a:schemeClr>
+                </a:solidFill>
+              </p:spPr>
+              <p:style>
+                <a:lnRef idx="2">
+                  <a:schemeClr val="accent1">
+                    <a:shade val="50000"/>
+                  </a:schemeClr>
+                </a:lnRef>
+                <a:fillRef idx="1">
+                  <a:schemeClr val="accent1"/>
+                </a:fillRef>
+                <a:effectRef idx="0">
+                  <a:schemeClr val="accent1"/>
+                </a:effectRef>
+                <a:fontRef idx="minor">
+                  <a:schemeClr val="lt1"/>
+                </a:fontRef>
+              </p:style>
+              <p:txBody>
+                <a:bodyPr rtlCol="0" anchor="ctr"/>
+                <a:lstStyle/>
+                <a:p>
+                  <a:pPr algn="ctr"/>
+                  <a:r>
+                    <a:rPr kumimoji="1" lang="en-US" altLang="zh-TW" sz="1400" dirty="0">
+                      <a:solidFill>
+                        <a:schemeClr val="tx1"/>
+                      </a:solidFill>
+                    </a:rPr>
+                    <a:t>other images</a:t>
+                  </a:r>
+                  <a:endParaRPr kumimoji="1" lang="zh-TW" altLang="en-US" sz="1400" dirty="0">
+                    <a:solidFill>
+                      <a:schemeClr val="tx1"/>
+                    </a:solidFill>
+                  </a:endParaRPr>
+                </a:p>
+              </p:txBody>
+            </p:sp>
+            <p:cxnSp>
+              <p:nvCxnSpPr>
+                <p:cNvPr id="87" name="肘形接點 86">
+                  <a:extLst>
+                    <a:ext uri="{FF2B5EF4-FFF2-40B4-BE49-F238E27FC236}">
+                      <a16:creationId xmlns:a16="http://schemas.microsoft.com/office/drawing/2014/main" id="{23A15655-A9B5-5848-96B3-44A3F299E517}"/>
+                    </a:ext>
+                  </a:extLst>
+                </p:cNvPr>
+                <p:cNvCxnSpPr>
+                  <a:cxnSpLocks/>
+                  <a:stCxn id="78" idx="2"/>
+                  <a:endCxn id="79" idx="2"/>
+                </p:cNvCxnSpPr>
+                <p:nvPr/>
+              </p:nvCxnSpPr>
+              <p:spPr>
+                <a:xfrm rot="10800000" flipH="1" flipV="1">
+                  <a:off x="4469524" y="2060028"/>
+                  <a:ext cx="18394" cy="867101"/>
+                </a:xfrm>
+                <a:prstGeom prst="bentConnector3">
+                  <a:avLst>
+                    <a:gd name="adj1" fmla="val -2161390"/>
+                  </a:avLst>
+                </a:prstGeom>
+                <a:ln w="9525">
+                  <a:tailEnd type="triangle"/>
+                </a:ln>
+              </p:spPr>
+              <p:style>
+                <a:lnRef idx="1">
+                  <a:schemeClr val="accent1"/>
+                </a:lnRef>
+                <a:fillRef idx="0">
+                  <a:schemeClr val="accent1"/>
+                </a:fillRef>
+                <a:effectRef idx="0">
+                  <a:schemeClr val="accent1"/>
+                </a:effectRef>
+                <a:fontRef idx="minor">
+                  <a:schemeClr val="tx1"/>
+                </a:fontRef>
+              </p:style>
+            </p:cxnSp>
+            <p:cxnSp>
+              <p:nvCxnSpPr>
+                <p:cNvPr id="89" name="肘形接點 88">
+                  <a:extLst>
+                    <a:ext uri="{FF2B5EF4-FFF2-40B4-BE49-F238E27FC236}">
+                      <a16:creationId xmlns:a16="http://schemas.microsoft.com/office/drawing/2014/main" id="{0E4D01CD-F7F4-B146-AC3D-31883F6D02A4}"/>
+                    </a:ext>
+                  </a:extLst>
+                </p:cNvPr>
+                <p:cNvCxnSpPr>
+                  <a:cxnSpLocks/>
+                  <a:stCxn id="78" idx="2"/>
+                  <a:endCxn id="82" idx="2"/>
+                </p:cNvCxnSpPr>
+                <p:nvPr/>
+              </p:nvCxnSpPr>
+              <p:spPr>
+                <a:xfrm rot="10800000" flipH="1" flipV="1">
+                  <a:off x="4469524" y="2060028"/>
+                  <a:ext cx="18394" cy="1450425"/>
+                </a:xfrm>
+                <a:prstGeom prst="bentConnector3">
+                  <a:avLst>
+                    <a:gd name="adj1" fmla="val -2161384"/>
+                  </a:avLst>
+                </a:prstGeom>
+                <a:ln w="9525">
+                  <a:tailEnd type="triangle"/>
+                </a:ln>
+              </p:spPr>
+              <p:style>
+                <a:lnRef idx="1">
+                  <a:schemeClr val="accent1"/>
+                </a:lnRef>
+                <a:fillRef idx="0">
+                  <a:schemeClr val="accent1"/>
+                </a:fillRef>
+                <a:effectRef idx="0">
+                  <a:schemeClr val="accent1"/>
+                </a:effectRef>
+                <a:fontRef idx="minor">
+                  <a:schemeClr val="tx1"/>
+                </a:fontRef>
+              </p:style>
+            </p:cxnSp>
+            <p:cxnSp>
+              <p:nvCxnSpPr>
+                <p:cNvPr id="90" name="肘形接點 89">
+                  <a:extLst>
+                    <a:ext uri="{FF2B5EF4-FFF2-40B4-BE49-F238E27FC236}">
+                      <a16:creationId xmlns:a16="http://schemas.microsoft.com/office/drawing/2014/main" id="{D13F9FAF-FC36-134D-8F74-0448C3D9B210}"/>
+                    </a:ext>
+                  </a:extLst>
+                </p:cNvPr>
+                <p:cNvCxnSpPr>
+                  <a:cxnSpLocks/>
+                  <a:stCxn id="78" idx="2"/>
+                  <a:endCxn id="84" idx="2"/>
+                </p:cNvCxnSpPr>
+                <p:nvPr/>
+              </p:nvCxnSpPr>
+              <p:spPr>
+                <a:xfrm rot="10800000" flipH="1" flipV="1">
+                  <a:off x="4469524" y="2060029"/>
+                  <a:ext cx="18394" cy="2039004"/>
+                </a:xfrm>
+                <a:prstGeom prst="bentConnector3">
+                  <a:avLst>
+                    <a:gd name="adj1" fmla="val -2161390"/>
+                  </a:avLst>
+                </a:prstGeom>
+                <a:ln w="9525">
+                  <a:tailEnd type="triangle"/>
+                </a:ln>
+              </p:spPr>
+              <p:style>
+                <a:lnRef idx="1">
+                  <a:schemeClr val="accent1"/>
+                </a:lnRef>
+                <a:fillRef idx="0">
+                  <a:schemeClr val="accent1"/>
+                </a:fillRef>
+                <a:effectRef idx="0">
+                  <a:schemeClr val="accent1"/>
+                </a:effectRef>
+                <a:fontRef idx="minor">
+                  <a:schemeClr val="tx1"/>
+                </a:fontRef>
+              </p:style>
+            </p:cxnSp>
+            <p:cxnSp>
+              <p:nvCxnSpPr>
+                <p:cNvPr id="91" name="肘形接點 90">
+                  <a:extLst>
+                    <a:ext uri="{FF2B5EF4-FFF2-40B4-BE49-F238E27FC236}">
+                      <a16:creationId xmlns:a16="http://schemas.microsoft.com/office/drawing/2014/main" id="{D99FDA6B-0A1A-2D4E-AC52-9421AE2AC4B1}"/>
+                    </a:ext>
+                  </a:extLst>
+                </p:cNvPr>
+                <p:cNvCxnSpPr>
+                  <a:cxnSpLocks/>
+                  <a:stCxn id="78" idx="2"/>
+                  <a:endCxn id="85" idx="2"/>
+                </p:cNvCxnSpPr>
+                <p:nvPr/>
+              </p:nvCxnSpPr>
+              <p:spPr>
+                <a:xfrm rot="10800000" flipV="1">
+                  <a:off x="4469524" y="2060028"/>
+                  <a:ext cx="12700" cy="2627583"/>
+                </a:xfrm>
+                <a:prstGeom prst="bentConnector3">
+                  <a:avLst>
+                    <a:gd name="adj1" fmla="val 3248252"/>
+                  </a:avLst>
+                </a:prstGeom>
+                <a:ln w="9525">
+                  <a:tailEnd type="triangle"/>
+                </a:ln>
+              </p:spPr>
+              <p:style>
+                <a:lnRef idx="1">
+                  <a:schemeClr val="accent1"/>
+                </a:lnRef>
+                <a:fillRef idx="0">
+                  <a:schemeClr val="accent1"/>
+                </a:fillRef>
+                <a:effectRef idx="0">
+                  <a:schemeClr val="accent1"/>
+                </a:effectRef>
+                <a:fontRef idx="minor">
+                  <a:schemeClr val="tx1"/>
+                </a:fontRef>
+              </p:style>
+            </p:cxnSp>
+            <p:cxnSp>
+              <p:nvCxnSpPr>
+                <p:cNvPr id="92" name="肘形接點 91">
+                  <a:extLst>
+                    <a:ext uri="{FF2B5EF4-FFF2-40B4-BE49-F238E27FC236}">
+                      <a16:creationId xmlns:a16="http://schemas.microsoft.com/office/drawing/2014/main" id="{B8FF4A83-FC6C-5448-987C-B169BBD919A5}"/>
+                    </a:ext>
+                  </a:extLst>
+                </p:cNvPr>
+                <p:cNvCxnSpPr>
+                  <a:cxnSpLocks/>
+                  <a:stCxn id="78" idx="2"/>
+                  <a:endCxn id="86" idx="2"/>
+                </p:cNvCxnSpPr>
+                <p:nvPr/>
+              </p:nvCxnSpPr>
+              <p:spPr>
+                <a:xfrm rot="10800000" flipV="1">
+                  <a:off x="4388070" y="2060028"/>
+                  <a:ext cx="81455" cy="3210907"/>
+                </a:xfrm>
+                <a:prstGeom prst="bentConnector3">
+                  <a:avLst>
+                    <a:gd name="adj1" fmla="val 490463"/>
+                  </a:avLst>
+                </a:prstGeom>
+                <a:ln w="9525">
+                  <a:tailEnd type="triangle"/>
+                </a:ln>
+              </p:spPr>
+              <p:style>
+                <a:lnRef idx="1">
+                  <a:schemeClr val="accent1"/>
+                </a:lnRef>
+                <a:fillRef idx="0">
+                  <a:schemeClr val="accent1"/>
+                </a:fillRef>
+                <a:effectRef idx="0">
+                  <a:schemeClr val="accent1"/>
+                </a:effectRef>
+                <a:fontRef idx="minor">
+                  <a:schemeClr val="tx1"/>
+                </a:fontRef>
+              </p:style>
+            </p:cxnSp>
+          </p:grpSp>
+        </p:grpSp>
+        <p:grpSp>
+          <p:nvGrpSpPr>
+            <p:cNvPr id="93" name="群組 92">
+              <a:extLst>
+                <a:ext uri="{FF2B5EF4-FFF2-40B4-BE49-F238E27FC236}">
+                  <a16:creationId xmlns:a16="http://schemas.microsoft.com/office/drawing/2014/main" id="{384F610D-9BEF-8D40-A16E-0158B1CED006}"/>
+                </a:ext>
+              </a:extLst>
+            </p:cNvPr>
+            <p:cNvGrpSpPr/>
+            <p:nvPr/>
+          </p:nvGrpSpPr>
+          <p:grpSpPr>
+            <a:xfrm>
+              <a:off x="4571801" y="1656026"/>
+              <a:ext cx="1627600" cy="3960091"/>
+              <a:chOff x="4747541" y="1640205"/>
+              <a:chExt cx="1627600" cy="3960091"/>
+            </a:xfrm>
+          </p:grpSpPr>
+          <p:sp>
+            <p:nvSpPr>
+              <p:cNvPr id="94" name="圓角矩形 93">
+                <a:extLst>
+                  <a:ext uri="{FF2B5EF4-FFF2-40B4-BE49-F238E27FC236}">
+                    <a16:creationId xmlns:a16="http://schemas.microsoft.com/office/drawing/2014/main" id="{CA800667-5E45-9347-9E4E-284079F8D1E0}"/>
+                  </a:ext>
+                </a:extLst>
+              </p:cNvPr>
+              <p:cNvSpPr/>
+              <p:nvPr/>
+            </p:nvSpPr>
+            <p:spPr>
+              <a:xfrm>
+                <a:off x="4747541" y="1640205"/>
+                <a:ext cx="1627600" cy="3960091"/>
+              </a:xfrm>
+              <a:prstGeom prst="roundRect">
+                <a:avLst/>
+              </a:prstGeom>
+              <a:solidFill>
+                <a:schemeClr val="accent4">
+                  <a:lumMod val="40000"/>
+                  <a:lumOff val="60000"/>
+                </a:schemeClr>
+              </a:solidFill>
+              <a:ln>
+                <a:noFill/>
+              </a:ln>
+            </p:spPr>
+            <p:style>
+              <a:lnRef idx="2">
+                <a:schemeClr val="accent1">
+                  <a:shade val="50000"/>
+                </a:schemeClr>
+              </a:lnRef>
+              <a:fillRef idx="1">
+                <a:schemeClr val="accent1"/>
+              </a:fillRef>
+              <a:effectRef idx="0">
+                <a:schemeClr val="accent1"/>
+              </a:effectRef>
+              <a:fontRef idx="minor">
+                <a:schemeClr val="lt1"/>
+              </a:fontRef>
+            </p:style>
+            <p:txBody>
+              <a:bodyPr rtlCol="0" anchor="ctr"/>
+              <a:lstStyle/>
+              <a:p>
+                <a:pPr algn="ctr"/>
+                <a:endParaRPr kumimoji="1" lang="zh-TW" altLang="en-US"/>
+              </a:p>
+            </p:txBody>
+          </p:sp>
+          <p:grpSp>
+            <p:nvGrpSpPr>
+              <p:cNvPr id="95" name="群組 94">
+                <a:extLst>
+                  <a:ext uri="{FF2B5EF4-FFF2-40B4-BE49-F238E27FC236}">
+                    <a16:creationId xmlns:a16="http://schemas.microsoft.com/office/drawing/2014/main" id="{057575A3-FD22-0742-91B8-AEA7E8E9B42B}"/>
+                  </a:ext>
+                </a:extLst>
+              </p:cNvPr>
+              <p:cNvGrpSpPr/>
+              <p:nvPr/>
+            </p:nvGrpSpPr>
+            <p:grpSpPr>
+              <a:xfrm>
+                <a:off x="5201498" y="1761609"/>
+                <a:ext cx="1135117" cy="1408384"/>
+                <a:chOff x="6300956" y="1728952"/>
+                <a:chExt cx="1135117" cy="1408384"/>
+              </a:xfrm>
+            </p:grpSpPr>
+            <p:sp>
+              <p:nvSpPr>
+                <p:cNvPr id="97" name="剪去並圓角化單一角落矩形 96">
+                  <a:extLst>
+                    <a:ext uri="{FF2B5EF4-FFF2-40B4-BE49-F238E27FC236}">
+                      <a16:creationId xmlns:a16="http://schemas.microsoft.com/office/drawing/2014/main" id="{5EF6B4D8-6B76-2646-9785-979F5C2FA810}"/>
+                    </a:ext>
+                  </a:extLst>
+                </p:cNvPr>
+                <p:cNvSpPr/>
+                <p:nvPr/>
+              </p:nvSpPr>
+              <p:spPr>
+                <a:xfrm>
+                  <a:off x="6382411" y="1728952"/>
+                  <a:ext cx="972208" cy="662152"/>
+                </a:xfrm>
+                <a:prstGeom prst="snipRoundRect">
+                  <a:avLst/>
+                </a:prstGeom>
+                <a:solidFill>
+                  <a:srgbClr val="FFC000"/>
+                </a:solidFill>
+              </p:spPr>
+              <p:style>
+                <a:lnRef idx="2">
+                  <a:schemeClr val="accent1">
+                    <a:shade val="50000"/>
+                  </a:schemeClr>
+                </a:lnRef>
+                <a:fillRef idx="1">
+                  <a:schemeClr val="accent1"/>
+                </a:fillRef>
+                <a:effectRef idx="0">
+                  <a:schemeClr val="accent1"/>
+                </a:effectRef>
+                <a:fontRef idx="minor">
+                  <a:schemeClr val="lt1"/>
+                </a:fontRef>
+              </p:style>
+              <p:txBody>
+                <a:bodyPr rtlCol="0" anchor="ctr"/>
+                <a:lstStyle/>
+                <a:p>
+                  <a:pPr algn="ctr"/>
+                  <a:r>
+                    <a:rPr kumimoji="1" lang="en-US" altLang="zh-TW" dirty="0">
+                      <a:solidFill>
+                        <a:schemeClr val="tx1"/>
+                      </a:solidFill>
+                    </a:rPr>
+                    <a:t>scripts</a:t>
+                  </a:r>
+                  <a:endParaRPr kumimoji="1" lang="zh-TW" altLang="en-US" dirty="0">
+                    <a:solidFill>
+                      <a:schemeClr val="tx1"/>
+                    </a:solidFill>
+                  </a:endParaRPr>
+                </a:p>
+              </p:txBody>
+            </p:sp>
+            <p:sp>
+              <p:nvSpPr>
+                <p:cNvPr id="98" name="橢圓 97">
+                  <a:extLst>
+                    <a:ext uri="{FF2B5EF4-FFF2-40B4-BE49-F238E27FC236}">
+                      <a16:creationId xmlns:a16="http://schemas.microsoft.com/office/drawing/2014/main" id="{BA32954B-703A-0E40-B46A-E7FC7566694C}"/>
+                    </a:ext>
+                  </a:extLst>
+                </p:cNvPr>
+                <p:cNvSpPr/>
+                <p:nvPr/>
+              </p:nvSpPr>
+              <p:spPr>
+                <a:xfrm>
+                  <a:off x="6300956" y="2716923"/>
+                  <a:ext cx="1135117" cy="420413"/>
+                </a:xfrm>
+                <a:prstGeom prst="ellipse">
+                  <a:avLst/>
+                </a:prstGeom>
+                <a:solidFill>
+                  <a:schemeClr val="accent6">
+                    <a:lumMod val="60000"/>
+                    <a:lumOff val="40000"/>
+                  </a:schemeClr>
+                </a:solidFill>
+              </p:spPr>
+              <p:style>
+                <a:lnRef idx="2">
+                  <a:schemeClr val="accent1">
+                    <a:shade val="50000"/>
+                  </a:schemeClr>
+                </a:lnRef>
+                <a:fillRef idx="1">
+                  <a:schemeClr val="accent1"/>
+                </a:fillRef>
+                <a:effectRef idx="0">
+                  <a:schemeClr val="accent1"/>
+                </a:effectRef>
+                <a:fontRef idx="minor">
+                  <a:schemeClr val="lt1"/>
+                </a:fontRef>
+              </p:style>
+              <p:txBody>
+                <a:bodyPr rtlCol="0" anchor="ctr"/>
+                <a:lstStyle/>
+                <a:p>
+                  <a:pPr algn="ctr"/>
+                  <a:r>
+                    <a:rPr kumimoji="1" lang="en-US" altLang="zh-TW" sz="1200" dirty="0">
+                      <a:solidFill>
+                        <a:schemeClr val="tx1"/>
+                      </a:solidFill>
+                    </a:rPr>
+                    <a:t>website </a:t>
+                  </a:r>
+                  <a:r>
+                    <a:rPr kumimoji="1" lang="en-US" altLang="zh-TW" sz="1200" dirty="0" err="1">
+                      <a:solidFill>
+                        <a:schemeClr val="tx1"/>
+                      </a:solidFill>
+                    </a:rPr>
+                    <a:t>javascript</a:t>
+                  </a:r>
+                  <a:endParaRPr kumimoji="1" lang="zh-TW" altLang="en-US" sz="1200" dirty="0">
+                    <a:solidFill>
+                      <a:schemeClr val="tx1"/>
+                    </a:solidFill>
+                  </a:endParaRPr>
+                </a:p>
+              </p:txBody>
+            </p:sp>
+            <p:cxnSp>
+              <p:nvCxnSpPr>
+                <p:cNvPr id="99" name="肘形接點 98">
+                  <a:extLst>
+                    <a:ext uri="{FF2B5EF4-FFF2-40B4-BE49-F238E27FC236}">
+                      <a16:creationId xmlns:a16="http://schemas.microsoft.com/office/drawing/2014/main" id="{F7942702-9E33-9B47-A9D8-48E8E488C48F}"/>
+                    </a:ext>
+                  </a:extLst>
+                </p:cNvPr>
+                <p:cNvCxnSpPr>
+                  <a:cxnSpLocks/>
+                  <a:stCxn id="97" idx="2"/>
+                  <a:endCxn id="98" idx="2"/>
+                </p:cNvCxnSpPr>
+                <p:nvPr/>
+              </p:nvCxnSpPr>
+              <p:spPr>
+                <a:xfrm rot="10800000" flipV="1">
+                  <a:off x="6300957" y="2060028"/>
+                  <a:ext cx="81455" cy="867102"/>
+                </a:xfrm>
+                <a:prstGeom prst="bentConnector3">
+                  <a:avLst>
+                    <a:gd name="adj1" fmla="val 472285"/>
+                  </a:avLst>
+                </a:prstGeom>
+                <a:ln w="9525">
+                  <a:tailEnd type="triangle"/>
+                </a:ln>
+              </p:spPr>
+              <p:style>
+                <a:lnRef idx="1">
+                  <a:schemeClr val="accent1"/>
+                </a:lnRef>
+                <a:fillRef idx="0">
+                  <a:schemeClr val="accent1"/>
+                </a:fillRef>
+                <a:effectRef idx="0">
+                  <a:schemeClr val="accent1"/>
+                </a:effectRef>
+                <a:fontRef idx="minor">
+                  <a:schemeClr val="tx1"/>
+                </a:fontRef>
+              </p:style>
+            </p:cxnSp>
+          </p:grpSp>
+        </p:grpSp>
+        <p:cxnSp>
+          <p:nvCxnSpPr>
+            <p:cNvPr id="40" name="肘形接點 39">
+              <a:extLst>
+                <a:ext uri="{FF2B5EF4-FFF2-40B4-BE49-F238E27FC236}">
+                  <a16:creationId xmlns:a16="http://schemas.microsoft.com/office/drawing/2014/main" id="{5AA407D8-912B-0B41-939D-73BA6645AF0A}"/>
+                </a:ext>
+              </a:extLst>
+            </p:cNvPr>
+            <p:cNvCxnSpPr>
+              <a:cxnSpLocks/>
+              <a:stCxn id="7" idx="2"/>
+            </p:cNvCxnSpPr>
+            <p:nvPr/>
+          </p:nvCxnSpPr>
+          <p:spPr>
+            <a:xfrm rot="10800000" flipH="1" flipV="1">
+              <a:off x="4145204" y="994354"/>
+              <a:ext cx="1435590" cy="767256"/>
+            </a:xfrm>
+            <a:prstGeom prst="bentConnector4">
+              <a:avLst>
+                <a:gd name="adj1" fmla="val -31336"/>
+                <a:gd name="adj2" fmla="val 71575"/>
+              </a:avLst>
+            </a:prstGeom>
+            <a:ln w="12700">
+              <a:tailEnd type="triangle"/>
+            </a:ln>
+          </p:spPr>
+          <p:style>
+            <a:lnRef idx="1">
+              <a:schemeClr val="accent1"/>
+            </a:lnRef>
+            <a:fillRef idx="0">
+              <a:schemeClr val="accent1"/>
+            </a:fillRef>
+            <a:effectRef idx="0">
+              <a:schemeClr val="accent1"/>
+            </a:effectRef>
+            <a:fontRef idx="minor">
+              <a:schemeClr val="tx1"/>
+            </a:fontRef>
+          </p:style>
+        </p:cxnSp>
+        <p:cxnSp>
+          <p:nvCxnSpPr>
+            <p:cNvPr id="50" name="肘形接點 49">
+              <a:extLst>
+                <a:ext uri="{FF2B5EF4-FFF2-40B4-BE49-F238E27FC236}">
+                  <a16:creationId xmlns:a16="http://schemas.microsoft.com/office/drawing/2014/main" id="{11399ECA-18D6-7C47-A561-4E3C5DBB902E}"/>
+                </a:ext>
+              </a:extLst>
+            </p:cNvPr>
+            <p:cNvCxnSpPr>
+              <a:cxnSpLocks/>
+              <a:stCxn id="7" idx="2"/>
+              <a:endCxn id="13" idx="3"/>
+            </p:cNvCxnSpPr>
+            <p:nvPr/>
+          </p:nvCxnSpPr>
+          <p:spPr>
+            <a:xfrm rot="10800000" flipH="1" flipV="1">
+              <a:off x="4145204" y="994353"/>
+              <a:ext cx="5261364" cy="767255"/>
+            </a:xfrm>
+            <a:prstGeom prst="bentConnector4">
+              <a:avLst>
+                <a:gd name="adj1" fmla="val -8550"/>
+                <a:gd name="adj2" fmla="val 71575"/>
+              </a:avLst>
+            </a:prstGeom>
+            <a:ln w="12700">
+              <a:tailEnd type="triangle"/>
+            </a:ln>
+          </p:spPr>
+          <p:style>
+            <a:lnRef idx="1">
+              <a:schemeClr val="accent1"/>
+            </a:lnRef>
+            <a:fillRef idx="0">
+              <a:schemeClr val="accent1"/>
+            </a:fillRef>
+            <a:effectRef idx="0">
+              <a:schemeClr val="accent1"/>
+            </a:effectRef>
+            <a:fontRef idx="minor">
+              <a:schemeClr val="tx1"/>
+            </a:fontRef>
+          </p:style>
+        </p:cxnSp>
+        <p:cxnSp>
+          <p:nvCxnSpPr>
+            <p:cNvPr id="43" name="肘形接點 42">
+              <a:extLst>
+                <a:ext uri="{FF2B5EF4-FFF2-40B4-BE49-F238E27FC236}">
+                  <a16:creationId xmlns:a16="http://schemas.microsoft.com/office/drawing/2014/main" id="{732AAB38-9C67-F045-ACD6-D691E7A2591E}"/>
+                </a:ext>
+              </a:extLst>
+            </p:cNvPr>
+            <p:cNvCxnSpPr>
+              <a:cxnSpLocks/>
+              <a:stCxn id="7" idx="2"/>
+            </p:cNvCxnSpPr>
+            <p:nvPr/>
+          </p:nvCxnSpPr>
+          <p:spPr>
+            <a:xfrm rot="10800000" flipH="1" flipV="1">
+              <a:off x="4145203" y="994353"/>
+              <a:ext cx="3348477" cy="767255"/>
+            </a:xfrm>
+            <a:prstGeom prst="bentConnector4">
+              <a:avLst>
+                <a:gd name="adj1" fmla="val -13435"/>
+                <a:gd name="adj2" fmla="val 71575"/>
+              </a:avLst>
+            </a:prstGeom>
+            <a:ln w="12700">
+              <a:tailEnd type="triangle"/>
+            </a:ln>
+          </p:spPr>
+          <p:style>
+            <a:lnRef idx="1">
+              <a:schemeClr val="accent1"/>
+            </a:lnRef>
+            <a:fillRef idx="0">
+              <a:schemeClr val="accent1"/>
+            </a:fillRef>
+            <a:effectRef idx="0">
+              <a:schemeClr val="accent1"/>
+            </a:effectRef>
+            <a:fontRef idx="minor">
+              <a:schemeClr val="tx1"/>
+            </a:fontRef>
+          </p:style>
+        </p:cxnSp>
+      </p:grpSp>
+    </p:spTree>
+    <p:extLst>
+      <p:ext uri="{BB962C8B-B14F-4D97-AF65-F5344CB8AC3E}">
+        <p14:creationId xmlns:p14="http://schemas.microsoft.com/office/powerpoint/2010/main" val="2955067327"/>
+      </p:ext>
+    </p:extLst>
+  </p:cSld>
+  <p:clrMapOvr>
+    <a:masterClrMapping/>
+  </p:clrMapOvr>
+</p:sld>
+</file>
+
 <file path=ppt/theme/theme1.xml><?xml version="1.0" encoding="utf-8"?>
 <a:theme xmlns:a="http://schemas.openxmlformats.org/drawingml/2006/main" name="Office 佈景主題">
   <a:themeElements>

</xml_diff>